<commit_message>
done bg slide, on to methods for control
</commit_message>
<xml_diff>
--- a/Presentation/elmz.pptx
+++ b/Presentation/elmz.pptx
@@ -5,12 +5,14 @@
     <p:sldMasterId id="2147483648" r:id="rId1"/>
   </p:sldMasterIdLst>
   <p:notesMasterIdLst>
-    <p:notesMasterId r:id="rId5"/>
+    <p:notesMasterId r:id="rId7"/>
   </p:notesMasterIdLst>
   <p:sldIdLst>
     <p:sldId id="256" r:id="rId2"/>
     <p:sldId id="257" r:id="rId3"/>
     <p:sldId id="258" r:id="rId4"/>
+    <p:sldId id="259" r:id="rId5"/>
+    <p:sldId id="260" r:id="rId6"/>
   </p:sldIdLst>
   <p:sldSz cx="12192000" cy="6858000"/>
   <p:notesSz cx="6858000" cy="9144000"/>
@@ -823,6 +825,13 @@
   <p:clrMapOvr>
     <a:masterClrMapping/>
   </p:clrMapOvr>
+  <p:timing>
+    <p:tnLst>
+      <p:par>
+        <p:cTn id="1" dur="indefinite" restart="never" nodeType="tmRoot"/>
+      </p:par>
+    </p:tnLst>
+  </p:timing>
 </p:sldLayout>
 </file>
 
@@ -1047,6 +1056,13 @@
   <p:clrMapOvr>
     <a:masterClrMapping/>
   </p:clrMapOvr>
+  <p:timing>
+    <p:tnLst>
+      <p:par>
+        <p:cTn id="1" dur="indefinite" restart="never" nodeType="tmRoot"/>
+      </p:par>
+    </p:tnLst>
+  </p:timing>
 </p:sldLayout>
 </file>
 
@@ -1216,7 +1232,7 @@
         </p:nvSpPr>
         <p:spPr>
           <a:xfrm>
-            <a:off x="838200" y="365125"/>
+            <a:off x="838200" y="0"/>
             <a:ext cx="10515600" cy="1325563"/>
           </a:xfrm>
           <a:prstGeom prst="rect">
@@ -1249,7 +1265,7 @@
         </p:nvSpPr>
         <p:spPr>
           <a:xfrm>
-            <a:off x="838200" y="1825625"/>
+            <a:off x="838200" y="1520825"/>
             <a:ext cx="10515600" cy="4351338"/>
           </a:xfrm>
           <a:prstGeom prst="rect">
@@ -1433,6 +1449,13 @@
     <p:sldLayoutId id="2147483650" r:id="rId2"/>
     <p:sldLayoutId id="2147483654" r:id="rId3"/>
   </p:sldLayoutIdLst>
+  <p:timing>
+    <p:tnLst>
+      <p:par>
+        <p:cTn id="1" dur="indefinite" restart="never" nodeType="tmRoot"/>
+      </p:par>
+    </p:tnLst>
+  </p:timing>
   <p:hf hdr="0"/>
   <p:txStyles>
     <p:titleStyle>
@@ -1444,7 +1467,7 @@
           <a:spcPct val="0"/>
         </a:spcBef>
         <a:buNone/>
-        <a:defRPr sz="4400" kern="1200">
+        <a:defRPr sz="6000" kern="1200">
           <a:solidFill>
             <a:schemeClr val="tx1"/>
           </a:solidFill>
@@ -1462,8 +1485,9 @@
         <a:spcBef>
           <a:spcPts val="1000"/>
         </a:spcBef>
-        <a:buFont typeface="Arial" panose="020B0604020202020204" pitchFamily="34" charset="0"/>
-        <a:buChar char="•"/>
+        <a:buSzPct val="120000"/>
+        <a:buFont typeface="Wingdings" panose="05000000000000000000" pitchFamily="2" charset="2"/>
+        <a:buChar char="Ø"/>
         <a:defRPr sz="2800" kern="1200">
           <a:solidFill>
             <a:schemeClr val="tx1"/>
@@ -1480,8 +1504,9 @@
         <a:spcBef>
           <a:spcPts val="500"/>
         </a:spcBef>
-        <a:buFont typeface="Arial" panose="020B0604020202020204" pitchFamily="34" charset="0"/>
-        <a:buChar char="•"/>
+        <a:buSzPct val="120000"/>
+        <a:buFont typeface="Wingdings" panose="05000000000000000000" pitchFamily="2" charset="2"/>
+        <a:buChar char="Ø"/>
         <a:defRPr sz="2400" kern="1200">
           <a:solidFill>
             <a:schemeClr val="tx1"/>
@@ -1498,8 +1523,9 @@
         <a:spcBef>
           <a:spcPts val="500"/>
         </a:spcBef>
-        <a:buFont typeface="Arial" panose="020B0604020202020204" pitchFamily="34" charset="0"/>
-        <a:buChar char="•"/>
+        <a:buSzPct val="120000"/>
+        <a:buFont typeface="Wingdings" panose="05000000000000000000" pitchFamily="2" charset="2"/>
+        <a:buChar char="Ø"/>
         <a:defRPr sz="2000" kern="1200">
           <a:solidFill>
             <a:schemeClr val="tx1"/>
@@ -1516,8 +1542,9 @@
         <a:spcBef>
           <a:spcPts val="500"/>
         </a:spcBef>
-        <a:buFont typeface="Arial" panose="020B0604020202020204" pitchFamily="34" charset="0"/>
-        <a:buChar char="•"/>
+        <a:buSzPct val="120000"/>
+        <a:buFont typeface="Wingdings" panose="05000000000000000000" pitchFamily="2" charset="2"/>
+        <a:buChar char="Ø"/>
         <a:defRPr sz="1800" kern="1200">
           <a:solidFill>
             <a:schemeClr val="tx1"/>
@@ -1534,8 +1561,9 @@
         <a:spcBef>
           <a:spcPts val="500"/>
         </a:spcBef>
-        <a:buFont typeface="Arial" panose="020B0604020202020204" pitchFamily="34" charset="0"/>
-        <a:buChar char="•"/>
+        <a:buSzPct val="120000"/>
+        <a:buFont typeface="Wingdings" panose="05000000000000000000" pitchFamily="2" charset="2"/>
+        <a:buChar char="Ø"/>
         <a:defRPr sz="1800" kern="1200">
           <a:solidFill>
             <a:schemeClr val="tx1"/>
@@ -1929,16 +1957,23 @@
             <p:ph type="title"/>
           </p:nvPr>
         </p:nvSpPr>
-        <p:spPr/>
-        <p:txBody>
-          <a:bodyPr/>
+        <p:spPr>
+          <a:xfrm>
+            <a:off x="838200" y="0"/>
+            <a:ext cx="10515600" cy="1325563"/>
+          </a:xfrm>
+        </p:spPr>
+        <p:txBody>
+          <a:bodyPr>
+            <a:normAutofit/>
+          </a:bodyPr>
           <a:lstStyle/>
           <a:p>
             <a:r>
-              <a:rPr lang="en-GB" dirty="0" smtClean="0"/>
+              <a:rPr lang="en-GB" sz="6000" dirty="0" smtClean="0"/>
               <a:t>Talk Outline	</a:t>
             </a:r>
-            <a:endParaRPr lang="en-GB" dirty="0"/>
+            <a:endParaRPr lang="en-GB" sz="6000" dirty="0"/>
           </a:p>
         </p:txBody>
       </p:sp>
@@ -1963,7 +1998,15 @@
             </a:pPr>
             <a:r>
               <a:rPr lang="en-GB" dirty="0" smtClean="0"/>
-              <a:t>Background understanding of ELMs</a:t>
+              <a:t>Background understanding of Edge Localised Modes (</a:t>
+            </a:r>
+            <a:r>
+              <a:rPr lang="en-GB" sz="3600" b="1" dirty="0" smtClean="0"/>
+              <a:t>ELMs</a:t>
+            </a:r>
+            <a:r>
+              <a:rPr lang="en-GB" dirty="0" smtClean="0"/>
+              <a:t>) </a:t>
             </a:r>
           </a:p>
           <a:p>
@@ -2114,6 +2157,13 @@
   <p:clrMapOvr>
     <a:masterClrMapping/>
   </p:clrMapOvr>
+  <p:timing>
+    <p:tnLst>
+      <p:par>
+        <p:cTn id="1" dur="indefinite" restart="never" nodeType="tmRoot"/>
+      </p:par>
+    </p:tnLst>
+  </p:timing>
 </p:sld>
 </file>
 
@@ -2144,7 +2194,12 @@
             <p:ph type="title"/>
           </p:nvPr>
         </p:nvSpPr>
-        <p:spPr/>
+        <p:spPr>
+          <a:xfrm>
+            <a:off x="190500" y="0"/>
+            <a:ext cx="12001500" cy="1325563"/>
+          </a:xfrm>
+        </p:spPr>
         <p:txBody>
           <a:bodyPr>
             <a:noAutofit/>
@@ -2152,14 +2207,14 @@
           <a:lstStyle/>
           <a:p>
             <a:r>
-              <a:rPr lang="en-GB" sz="5200" dirty="0" smtClean="0"/>
+              <a:rPr lang="en-GB" sz="6000" dirty="0" smtClean="0"/>
               <a:t>1. </a:t>
             </a:r>
             <a:r>
-              <a:rPr lang="en-GB" sz="5200" dirty="0" smtClean="0"/>
+              <a:rPr lang="en-GB" sz="6000" dirty="0" smtClean="0"/>
               <a:t>Background understanding of ELMs</a:t>
             </a:r>
-            <a:endParaRPr lang="en-GB" sz="5200" dirty="0"/>
+            <a:endParaRPr lang="en-GB" sz="6000" dirty="0"/>
           </a:p>
         </p:txBody>
       </p:sp>
@@ -2173,30 +2228,93 @@
             <p:ph idx="1"/>
           </p:nvPr>
         </p:nvSpPr>
-        <p:spPr/>
+        <p:spPr>
+          <a:xfrm>
+            <a:off x="838200" y="1825625"/>
+            <a:ext cx="6915150" cy="4351338"/>
+          </a:xfrm>
+        </p:spPr>
         <p:txBody>
           <a:bodyPr/>
           <a:lstStyle/>
           <a:p>
+            <a:pPr>
+              <a:buSzPct val="120000"/>
+              <a:buFont typeface="Wingdings" panose="05000000000000000000" pitchFamily="2" charset="2"/>
+              <a:buChar char="Ø"/>
+            </a:pPr>
             <a:r>
               <a:rPr lang="en-GB" dirty="0" smtClean="0"/>
               <a:t>Generic to tokamaks in H-mode</a:t>
             </a:r>
           </a:p>
           <a:p>
+            <a:pPr>
+              <a:buSzPct val="120000"/>
+              <a:buFont typeface="Wingdings" panose="05000000000000000000" pitchFamily="2" charset="2"/>
+              <a:buChar char="Ø"/>
+            </a:pPr>
+            <a:endParaRPr lang="en-GB" dirty="0" smtClean="0"/>
+          </a:p>
+          <a:p>
+            <a:pPr>
+              <a:buSzPct val="120000"/>
+              <a:buFont typeface="Wingdings" panose="05000000000000000000" pitchFamily="2" charset="2"/>
+              <a:buChar char="Ø"/>
+            </a:pPr>
+            <a:r>
+              <a:rPr lang="en-GB" dirty="0" smtClean="0"/>
+              <a:t>Edge pedestal gradient is inherently unstable</a:t>
+            </a:r>
+          </a:p>
+          <a:p>
+            <a:pPr>
+              <a:buSzPct val="120000"/>
+              <a:buFont typeface="Wingdings" panose="05000000000000000000" pitchFamily="2" charset="2"/>
+              <a:buChar char="Ø"/>
+            </a:pPr>
+            <a:endParaRPr lang="en-GB" dirty="0" smtClean="0"/>
+          </a:p>
+          <a:p>
+            <a:pPr>
+              <a:buSzPct val="120000"/>
+              <a:buFont typeface="Wingdings" panose="05000000000000000000" pitchFamily="2" charset="2"/>
+              <a:buChar char="Ø"/>
+            </a:pPr>
             <a:r>
               <a:rPr lang="en-GB" dirty="0" smtClean="0"/>
               <a:t>Several different types</a:t>
             </a:r>
           </a:p>
           <a:p>
-            <a:pPr lvl="1"/>
+            <a:pPr lvl="1">
+              <a:buSzPct val="120000"/>
+              <a:buFont typeface="Wingdings" panose="05000000000000000000" pitchFamily="2" charset="2"/>
+              <a:buChar char="Ø"/>
+            </a:pPr>
             <a:r>
               <a:rPr lang="en-GB" dirty="0" smtClean="0"/>
-              <a:t>Focussing on type I ELMs in this talk</a:t>
-            </a:r>
-          </a:p>
-          <a:p>
+              <a:t>Focussing on type I ELMs here</a:t>
+            </a:r>
+          </a:p>
+          <a:p>
+            <a:pPr lvl="1">
+              <a:buSzPct val="120000"/>
+              <a:buFont typeface="Wingdings" panose="05000000000000000000" pitchFamily="2" charset="2"/>
+              <a:buChar char="Ø"/>
+            </a:pPr>
+            <a:endParaRPr lang="en-GB" dirty="0" smtClean="0"/>
+          </a:p>
+          <a:p>
+            <a:pPr>
+              <a:buSzPct val="120000"/>
+              <a:buFont typeface="Wingdings" panose="05000000000000000000" pitchFamily="2" charset="2"/>
+              <a:buChar char="Ø"/>
+            </a:pPr>
+            <a:r>
+              <a:rPr lang="en-GB" dirty="0" smtClean="0"/>
+              <a:t>Thought to be caused by Peeling-Ballooning mode instabilities </a:t>
+            </a:r>
             <a:endParaRPr lang="en-GB" dirty="0"/>
           </a:p>
         </p:txBody>
@@ -2278,7 +2396,7 @@
         </p:nvGrpSpPr>
         <p:grpSpPr>
           <a:xfrm>
-            <a:off x="7390794" y="1870075"/>
+            <a:off x="7734300" y="1825625"/>
             <a:ext cx="4572000" cy="3487367"/>
             <a:chOff x="7009794" y="2057184"/>
             <a:chExt cx="4572000" cy="3487367"/>
@@ -2365,18 +2483,18 @@
                 <a:t>. Phys. </a:t>
               </a:r>
               <a:r>
-                <a:rPr lang="en-GB" sz="1600" dirty="0" err="1" smtClean="0">
+                <a:rPr lang="en-GB" sz="1600" b="1" dirty="0" smtClean="0">
                   <a:latin typeface="Batang" panose="02030600000101010101" pitchFamily="18" charset="-127"/>
                   <a:ea typeface="Batang" panose="02030600000101010101" pitchFamily="18" charset="-127"/>
                 </a:rPr>
-                <a:t>Fusi</a:t>
+                <a:t>48</a:t>
               </a:r>
               <a:r>
                 <a:rPr lang="en-GB" sz="1600" dirty="0" smtClean="0">
                   <a:latin typeface="Batang" panose="02030600000101010101" pitchFamily="18" charset="-127"/>
                   <a:ea typeface="Batang" panose="02030600000101010101" pitchFamily="18" charset="-127"/>
                 </a:rPr>
-                <a:t>. 48 2006</a:t>
+                <a:t> 2006</a:t>
               </a:r>
               <a:endParaRPr lang="en-GB" sz="1600" dirty="0">
                 <a:latin typeface="Batang" panose="02030600000101010101" pitchFamily="18" charset="-127"/>
@@ -2396,6 +2514,1087 @@
   <p:clrMapOvr>
     <a:masterClrMapping/>
   </p:clrMapOvr>
+  <p:timing>
+    <p:tnLst>
+      <p:par>
+        <p:cTn id="1" dur="indefinite" restart="never" nodeType="tmRoot">
+          <p:childTnLst>
+            <p:seq concurrent="1" nextAc="seek">
+              <p:cTn id="2" dur="indefinite" nodeType="mainSeq">
+                <p:childTnLst>
+                  <p:par>
+                    <p:cTn id="3" fill="hold">
+                      <p:stCondLst>
+                        <p:cond delay="indefinite"/>
+                      </p:stCondLst>
+                      <p:childTnLst>
+                        <p:par>
+                          <p:cTn id="4" fill="hold">
+                            <p:stCondLst>
+                              <p:cond delay="0"/>
+                            </p:stCondLst>
+                            <p:childTnLst>
+                              <p:par>
+                                <p:cTn id="5" presetID="1" presetClass="entr" presetSubtype="0" fill="hold" nodeType="clickEffect">
+                                  <p:stCondLst>
+                                    <p:cond delay="0"/>
+                                  </p:stCondLst>
+                                  <p:childTnLst>
+                                    <p:set>
+                                      <p:cBhvr>
+                                        <p:cTn id="6" dur="1" fill="hold">
+                                          <p:stCondLst>
+                                            <p:cond delay="0"/>
+                                          </p:stCondLst>
+                                        </p:cTn>
+                                        <p:tgtEl>
+                                          <p:spTgt spid="3">
+                                            <p:txEl>
+                                              <p:pRg st="0" end="0"/>
+                                            </p:txEl>
+                                          </p:spTgt>
+                                        </p:tgtEl>
+                                        <p:attrNameLst>
+                                          <p:attrName>style.visibility</p:attrName>
+                                        </p:attrNameLst>
+                                      </p:cBhvr>
+                                      <p:to>
+                                        <p:strVal val="visible"/>
+                                      </p:to>
+                                    </p:set>
+                                  </p:childTnLst>
+                                </p:cTn>
+                              </p:par>
+                            </p:childTnLst>
+                          </p:cTn>
+                        </p:par>
+                      </p:childTnLst>
+                    </p:cTn>
+                  </p:par>
+                  <p:par>
+                    <p:cTn id="7" fill="hold">
+                      <p:stCondLst>
+                        <p:cond delay="indefinite"/>
+                      </p:stCondLst>
+                      <p:childTnLst>
+                        <p:par>
+                          <p:cTn id="8" fill="hold">
+                            <p:stCondLst>
+                              <p:cond delay="0"/>
+                            </p:stCondLst>
+                            <p:childTnLst>
+                              <p:par>
+                                <p:cTn id="9" presetID="1" presetClass="entr" presetSubtype="0" fill="hold" nodeType="clickEffect">
+                                  <p:stCondLst>
+                                    <p:cond delay="0"/>
+                                  </p:stCondLst>
+                                  <p:childTnLst>
+                                    <p:set>
+                                      <p:cBhvr>
+                                        <p:cTn id="10" dur="1" fill="hold">
+                                          <p:stCondLst>
+                                            <p:cond delay="0"/>
+                                          </p:stCondLst>
+                                        </p:cTn>
+                                        <p:tgtEl>
+                                          <p:spTgt spid="3">
+                                            <p:txEl>
+                                              <p:pRg st="2" end="2"/>
+                                            </p:txEl>
+                                          </p:spTgt>
+                                        </p:tgtEl>
+                                        <p:attrNameLst>
+                                          <p:attrName>style.visibility</p:attrName>
+                                        </p:attrNameLst>
+                                      </p:cBhvr>
+                                      <p:to>
+                                        <p:strVal val="visible"/>
+                                      </p:to>
+                                    </p:set>
+                                  </p:childTnLst>
+                                </p:cTn>
+                              </p:par>
+                            </p:childTnLst>
+                          </p:cTn>
+                        </p:par>
+                      </p:childTnLst>
+                    </p:cTn>
+                  </p:par>
+                  <p:par>
+                    <p:cTn id="11" fill="hold">
+                      <p:stCondLst>
+                        <p:cond delay="indefinite"/>
+                      </p:stCondLst>
+                      <p:childTnLst>
+                        <p:par>
+                          <p:cTn id="12" fill="hold">
+                            <p:stCondLst>
+                              <p:cond delay="0"/>
+                            </p:stCondLst>
+                            <p:childTnLst>
+                              <p:par>
+                                <p:cTn id="13" presetID="1" presetClass="entr" presetSubtype="0" fill="hold" nodeType="clickEffect">
+                                  <p:stCondLst>
+                                    <p:cond delay="0"/>
+                                  </p:stCondLst>
+                                  <p:childTnLst>
+                                    <p:set>
+                                      <p:cBhvr>
+                                        <p:cTn id="14" dur="1" fill="hold">
+                                          <p:stCondLst>
+                                            <p:cond delay="0"/>
+                                          </p:stCondLst>
+                                        </p:cTn>
+                                        <p:tgtEl>
+                                          <p:spTgt spid="3">
+                                            <p:txEl>
+                                              <p:pRg st="4" end="4"/>
+                                            </p:txEl>
+                                          </p:spTgt>
+                                        </p:tgtEl>
+                                        <p:attrNameLst>
+                                          <p:attrName>style.visibility</p:attrName>
+                                        </p:attrNameLst>
+                                      </p:cBhvr>
+                                      <p:to>
+                                        <p:strVal val="visible"/>
+                                      </p:to>
+                                    </p:set>
+                                  </p:childTnLst>
+                                </p:cTn>
+                              </p:par>
+                              <p:par>
+                                <p:cTn id="15" presetID="1" presetClass="entr" presetSubtype="0" fill="hold" nodeType="withEffect">
+                                  <p:stCondLst>
+                                    <p:cond delay="0"/>
+                                  </p:stCondLst>
+                                  <p:childTnLst>
+                                    <p:set>
+                                      <p:cBhvr>
+                                        <p:cTn id="16" dur="1" fill="hold">
+                                          <p:stCondLst>
+                                            <p:cond delay="0"/>
+                                          </p:stCondLst>
+                                        </p:cTn>
+                                        <p:tgtEl>
+                                          <p:spTgt spid="3">
+                                            <p:txEl>
+                                              <p:pRg st="5" end="5"/>
+                                            </p:txEl>
+                                          </p:spTgt>
+                                        </p:tgtEl>
+                                        <p:attrNameLst>
+                                          <p:attrName>style.visibility</p:attrName>
+                                        </p:attrNameLst>
+                                      </p:cBhvr>
+                                      <p:to>
+                                        <p:strVal val="visible"/>
+                                      </p:to>
+                                    </p:set>
+                                  </p:childTnLst>
+                                </p:cTn>
+                              </p:par>
+                            </p:childTnLst>
+                          </p:cTn>
+                        </p:par>
+                      </p:childTnLst>
+                    </p:cTn>
+                  </p:par>
+                  <p:par>
+                    <p:cTn id="17" fill="hold">
+                      <p:stCondLst>
+                        <p:cond delay="indefinite"/>
+                      </p:stCondLst>
+                      <p:childTnLst>
+                        <p:par>
+                          <p:cTn id="18" fill="hold">
+                            <p:stCondLst>
+                              <p:cond delay="0"/>
+                            </p:stCondLst>
+                            <p:childTnLst>
+                              <p:par>
+                                <p:cTn id="19" presetID="1" presetClass="entr" presetSubtype="0" fill="hold" grpId="0" nodeType="clickEffect">
+                                  <p:stCondLst>
+                                    <p:cond delay="0"/>
+                                  </p:stCondLst>
+                                  <p:childTnLst>
+                                    <p:set>
+                                      <p:cBhvr>
+                                        <p:cTn id="20" dur="1" fill="hold">
+                                          <p:stCondLst>
+                                            <p:cond delay="0"/>
+                                          </p:stCondLst>
+                                        </p:cTn>
+                                        <p:tgtEl>
+                                          <p:spTgt spid="3">
+                                            <p:txEl>
+                                              <p:pRg st="7" end="7"/>
+                                            </p:txEl>
+                                          </p:spTgt>
+                                        </p:tgtEl>
+                                        <p:attrNameLst>
+                                          <p:attrName>style.visibility</p:attrName>
+                                        </p:attrNameLst>
+                                      </p:cBhvr>
+                                      <p:to>
+                                        <p:strVal val="visible"/>
+                                      </p:to>
+                                    </p:set>
+                                  </p:childTnLst>
+                                </p:cTn>
+                              </p:par>
+                              <p:par>
+                                <p:cTn id="21" presetID="1" presetClass="entr" presetSubtype="0" fill="hold" nodeType="withEffect">
+                                  <p:stCondLst>
+                                    <p:cond delay="0"/>
+                                  </p:stCondLst>
+                                  <p:childTnLst>
+                                    <p:set>
+                                      <p:cBhvr>
+                                        <p:cTn id="22" dur="1" fill="hold">
+                                          <p:stCondLst>
+                                            <p:cond delay="0"/>
+                                          </p:stCondLst>
+                                        </p:cTn>
+                                        <p:tgtEl>
+                                          <p:spTgt spid="9"/>
+                                        </p:tgtEl>
+                                        <p:attrNameLst>
+                                          <p:attrName>style.visibility</p:attrName>
+                                        </p:attrNameLst>
+                                      </p:cBhvr>
+                                      <p:to>
+                                        <p:strVal val="visible"/>
+                                      </p:to>
+                                    </p:set>
+                                  </p:childTnLst>
+                                </p:cTn>
+                              </p:par>
+                            </p:childTnLst>
+                          </p:cTn>
+                        </p:par>
+                      </p:childTnLst>
+                    </p:cTn>
+                  </p:par>
+                </p:childTnLst>
+              </p:cTn>
+              <p:prevCondLst>
+                <p:cond evt="onPrev" delay="0">
+                  <p:tgtEl>
+                    <p:sldTgt/>
+                  </p:tgtEl>
+                </p:cond>
+              </p:prevCondLst>
+              <p:nextCondLst>
+                <p:cond evt="onNext" delay="0">
+                  <p:tgtEl>
+                    <p:sldTgt/>
+                  </p:tgtEl>
+                </p:cond>
+              </p:nextCondLst>
+            </p:seq>
+          </p:childTnLst>
+        </p:cTn>
+      </p:par>
+    </p:tnLst>
+    <p:bldLst>
+      <p:bldP spid="3" grpId="0" uiExpand="1" build="p"/>
+    </p:bldLst>
+  </p:timing>
+</p:sld>
+</file>
+
+<file path=ppt/slides/slide4.xml><?xml version="1.0" encoding="utf-8"?>
+<p:sld xmlns:a="http://schemas.openxmlformats.org/drawingml/2006/main" xmlns:r="http://schemas.openxmlformats.org/officeDocument/2006/relationships" xmlns:p="http://schemas.openxmlformats.org/presentationml/2006/main">
+  <p:cSld>
+    <p:spTree>
+      <p:nvGrpSpPr>
+        <p:cNvPr id="1" name=""/>
+        <p:cNvGrpSpPr/>
+        <p:nvPr/>
+      </p:nvGrpSpPr>
+      <p:grpSpPr>
+        <a:xfrm>
+          <a:off x="0" y="0"/>
+          <a:ext cx="0" cy="0"/>
+          <a:chOff x="0" y="0"/>
+          <a:chExt cx="0" cy="0"/>
+        </a:xfrm>
+      </p:grpSpPr>
+      <p:sp>
+        <p:nvSpPr>
+          <p:cNvPr id="2" name="Title 1"/>
+          <p:cNvSpPr>
+            <a:spLocks noGrp="1"/>
+          </p:cNvSpPr>
+          <p:nvPr>
+            <p:ph type="title"/>
+          </p:nvPr>
+        </p:nvSpPr>
+        <p:spPr>
+          <a:xfrm>
+            <a:off x="838200" y="0"/>
+            <a:ext cx="10515600" cy="1325563"/>
+          </a:xfrm>
+        </p:spPr>
+        <p:txBody>
+          <a:bodyPr/>
+          <a:lstStyle/>
+          <a:p>
+            <a:r>
+              <a:rPr lang="en-GB" sz="6000" dirty="0" smtClean="0"/>
+              <a:t>2. </a:t>
+            </a:r>
+            <a:r>
+              <a:rPr lang="en-GB" sz="6000" dirty="0" smtClean="0"/>
+              <a:t>Problems ELMs cause</a:t>
+            </a:r>
+            <a:endParaRPr lang="en-GB" dirty="0"/>
+          </a:p>
+        </p:txBody>
+      </p:sp>
+      <p:pic>
+        <p:nvPicPr>
+          <p:cNvPr id="7" name="Content Placeholder 6"/>
+          <p:cNvPicPr>
+            <a:picLocks noGrp="1" noChangeAspect="1"/>
+          </p:cNvPicPr>
+          <p:nvPr>
+            <p:ph idx="1"/>
+          </p:nvPr>
+        </p:nvPicPr>
+        <p:blipFill>
+          <a:blip r:embed="rId2">
+            <a:extLst>
+              <a:ext uri="{28A0092B-C50C-407E-A947-70E740481C1C}">
+                <a14:useLocalDpi xmlns:a14="http://schemas.microsoft.com/office/drawing/2010/main" val="0"/>
+              </a:ext>
+            </a:extLst>
+          </a:blip>
+          <a:stretch>
+            <a:fillRect/>
+          </a:stretch>
+        </p:blipFill>
+        <p:spPr>
+          <a:xfrm>
+            <a:off x="2032041" y="1047749"/>
+            <a:ext cx="8127918" cy="5491163"/>
+          </a:xfrm>
+        </p:spPr>
+      </p:pic>
+      <p:sp>
+        <p:nvSpPr>
+          <p:cNvPr id="4" name="Date Placeholder 3"/>
+          <p:cNvSpPr>
+            <a:spLocks noGrp="1"/>
+          </p:cNvSpPr>
+          <p:nvPr>
+            <p:ph type="dt" sz="half" idx="10"/>
+          </p:nvPr>
+        </p:nvSpPr>
+        <p:spPr/>
+        <p:txBody>
+          <a:bodyPr/>
+          <a:lstStyle/>
+          <a:p>
+            <a:r>
+              <a:rPr lang="en-GB" smtClean="0"/>
+              <a:t>31/05/2016</a:t>
+            </a:r>
+            <a:endParaRPr lang="en-GB" dirty="0"/>
+          </a:p>
+        </p:txBody>
+      </p:sp>
+      <p:sp>
+        <p:nvSpPr>
+          <p:cNvPr id="5" name="Footer Placeholder 4"/>
+          <p:cNvSpPr>
+            <a:spLocks noGrp="1"/>
+          </p:cNvSpPr>
+          <p:nvPr>
+            <p:ph type="ftr" sz="quarter" idx="11"/>
+          </p:nvPr>
+        </p:nvSpPr>
+        <p:spPr/>
+        <p:txBody>
+          <a:bodyPr/>
+          <a:lstStyle/>
+          <a:p>
+            <a:r>
+              <a:rPr lang="en-GB" smtClean="0"/>
+              <a:t>JOA509 – Frontiers of Fusion</a:t>
+            </a:r>
+            <a:endParaRPr lang="en-GB" dirty="0"/>
+          </a:p>
+        </p:txBody>
+      </p:sp>
+      <p:sp>
+        <p:nvSpPr>
+          <p:cNvPr id="6" name="Slide Number Placeholder 5"/>
+          <p:cNvSpPr>
+            <a:spLocks noGrp="1"/>
+          </p:cNvSpPr>
+          <p:nvPr>
+            <p:ph type="sldNum" sz="quarter" idx="12"/>
+          </p:nvPr>
+        </p:nvSpPr>
+        <p:spPr/>
+        <p:txBody>
+          <a:bodyPr/>
+          <a:lstStyle/>
+          <a:p>
+            <a:fld id="{581BB28B-6C27-444C-B2E2-3960C28AE47A}" type="slidenum">
+              <a:rPr lang="en-GB" smtClean="0"/>
+              <a:t>4</a:t>
+            </a:fld>
+            <a:endParaRPr lang="en-GB"/>
+          </a:p>
+        </p:txBody>
+      </p:sp>
+      <p:sp>
+        <p:nvSpPr>
+          <p:cNvPr id="8" name="TextBox 7"/>
+          <p:cNvSpPr txBox="1"/>
+          <p:nvPr/>
+        </p:nvSpPr>
+        <p:spPr>
+          <a:xfrm>
+            <a:off x="2209800" y="2076450"/>
+            <a:ext cx="6400800" cy="2677656"/>
+          </a:xfrm>
+          <a:prstGeom prst="rect">
+            <a:avLst/>
+          </a:prstGeom>
+          <a:solidFill>
+            <a:schemeClr val="bg1">
+              <a:alpha val="94000"/>
+            </a:schemeClr>
+          </a:solidFill>
+        </p:spPr>
+        <p:txBody>
+          <a:bodyPr wrap="square" rtlCol="0">
+            <a:spAutoFit/>
+          </a:bodyPr>
+          <a:lstStyle/>
+          <a:p>
+            <a:pPr marL="457200" indent="-457200">
+              <a:buSzPct val="120000"/>
+              <a:buFont typeface="Wingdings" panose="05000000000000000000" pitchFamily="2" charset="2"/>
+              <a:buChar char="Ø"/>
+            </a:pPr>
+            <a:r>
+              <a:rPr lang="en-GB" sz="2800" dirty="0" smtClean="0">
+                <a:latin typeface="Baskerville Old Face" panose="02020602080505020303" pitchFamily="18" charset="0"/>
+              </a:rPr>
+              <a:t>Loss of confinement</a:t>
+            </a:r>
+          </a:p>
+          <a:p>
+            <a:pPr marL="457200" indent="-457200">
+              <a:buSzPct val="120000"/>
+              <a:buFont typeface="Wingdings" panose="05000000000000000000" pitchFamily="2" charset="2"/>
+              <a:buChar char="Ø"/>
+            </a:pPr>
+            <a:endParaRPr lang="en-GB" sz="2800" dirty="0" smtClean="0">
+              <a:latin typeface="Baskerville Old Face" panose="02020602080505020303" pitchFamily="18" charset="0"/>
+            </a:endParaRPr>
+          </a:p>
+          <a:p>
+            <a:pPr marL="457200" indent="-457200">
+              <a:buSzPct val="120000"/>
+              <a:buFont typeface="Wingdings" panose="05000000000000000000" pitchFamily="2" charset="2"/>
+              <a:buChar char="Ø"/>
+            </a:pPr>
+            <a:r>
+              <a:rPr lang="en-GB" sz="2800" dirty="0" smtClean="0">
+                <a:latin typeface="Baskerville Old Face" panose="02020602080505020303" pitchFamily="18" charset="0"/>
+              </a:rPr>
+              <a:t>High heat flux expelled from the plasma</a:t>
+            </a:r>
+          </a:p>
+          <a:p>
+            <a:pPr marL="914400" lvl="1" indent="-457200">
+              <a:buSzPct val="120000"/>
+              <a:buFont typeface="Wingdings" panose="05000000000000000000" pitchFamily="2" charset="2"/>
+              <a:buChar char="Ø"/>
+            </a:pPr>
+            <a:r>
+              <a:rPr lang="en-GB" sz="2800" dirty="0" smtClean="0">
+                <a:latin typeface="Baskerville Old Face" panose="02020602080505020303" pitchFamily="18" charset="0"/>
+              </a:rPr>
+              <a:t>Can cause critical damage to PFCs</a:t>
+            </a:r>
+          </a:p>
+          <a:p>
+            <a:pPr marL="457200" indent="-457200">
+              <a:buSzPct val="120000"/>
+              <a:buFont typeface="Wingdings" panose="05000000000000000000" pitchFamily="2" charset="2"/>
+              <a:buChar char="Ø"/>
+            </a:pPr>
+            <a:endParaRPr lang="en-GB" sz="2800" dirty="0">
+              <a:latin typeface="Baskerville Old Face" panose="02020602080505020303" pitchFamily="18" charset="0"/>
+            </a:endParaRPr>
+          </a:p>
+          <a:p>
+            <a:pPr marL="457200" indent="-457200">
+              <a:buSzPct val="120000"/>
+              <a:buFont typeface="Wingdings" panose="05000000000000000000" pitchFamily="2" charset="2"/>
+              <a:buChar char="Ø"/>
+            </a:pPr>
+            <a:r>
+              <a:rPr lang="en-GB" sz="2800" dirty="0" smtClean="0">
+                <a:latin typeface="Baskerville Old Face" panose="02020602080505020303" pitchFamily="18" charset="0"/>
+              </a:rPr>
+              <a:t>May destabilise core plasma modes</a:t>
+            </a:r>
+            <a:endParaRPr lang="en-GB" sz="2800" dirty="0">
+              <a:latin typeface="Baskerville Old Face" panose="02020602080505020303" pitchFamily="18" charset="0"/>
+            </a:endParaRPr>
+          </a:p>
+        </p:txBody>
+      </p:sp>
+    </p:spTree>
+    <p:extLst>
+      <p:ext uri="{BB962C8B-B14F-4D97-AF65-F5344CB8AC3E}">
+        <p14:creationId xmlns:p14="http://schemas.microsoft.com/office/powerpoint/2010/main" val="2389582712"/>
+      </p:ext>
+    </p:extLst>
+  </p:cSld>
+  <p:clrMapOvr>
+    <a:masterClrMapping/>
+  </p:clrMapOvr>
+  <p:timing>
+    <p:tnLst>
+      <p:par>
+        <p:cTn id="1" dur="indefinite" restart="never" nodeType="tmRoot">
+          <p:childTnLst>
+            <p:seq concurrent="1" nextAc="seek">
+              <p:cTn id="2" dur="indefinite" nodeType="mainSeq">
+                <p:childTnLst>
+                  <p:par>
+                    <p:cTn id="3" fill="hold">
+                      <p:stCondLst>
+                        <p:cond delay="indefinite"/>
+                      </p:stCondLst>
+                      <p:childTnLst>
+                        <p:par>
+                          <p:cTn id="4" fill="hold">
+                            <p:stCondLst>
+                              <p:cond delay="0"/>
+                            </p:stCondLst>
+                            <p:childTnLst>
+                              <p:par>
+                                <p:cTn id="5" presetID="1" presetClass="entr" presetSubtype="0" fill="hold" grpId="0" nodeType="clickEffect">
+                                  <p:stCondLst>
+                                    <p:cond delay="0"/>
+                                  </p:stCondLst>
+                                  <p:childTnLst>
+                                    <p:set>
+                                      <p:cBhvr>
+                                        <p:cTn id="6" dur="1" fill="hold">
+                                          <p:stCondLst>
+                                            <p:cond delay="0"/>
+                                          </p:stCondLst>
+                                        </p:cTn>
+                                        <p:tgtEl>
+                                          <p:spTgt spid="8">
+                                            <p:bg/>
+                                          </p:spTgt>
+                                        </p:tgtEl>
+                                        <p:attrNameLst>
+                                          <p:attrName>style.visibility</p:attrName>
+                                        </p:attrNameLst>
+                                      </p:cBhvr>
+                                      <p:to>
+                                        <p:strVal val="visible"/>
+                                      </p:to>
+                                    </p:set>
+                                  </p:childTnLst>
+                                </p:cTn>
+                              </p:par>
+                            </p:childTnLst>
+                          </p:cTn>
+                        </p:par>
+                      </p:childTnLst>
+                    </p:cTn>
+                  </p:par>
+                  <p:par>
+                    <p:cTn id="7" fill="hold">
+                      <p:stCondLst>
+                        <p:cond delay="indefinite"/>
+                      </p:stCondLst>
+                      <p:childTnLst>
+                        <p:par>
+                          <p:cTn id="8" fill="hold">
+                            <p:stCondLst>
+                              <p:cond delay="0"/>
+                            </p:stCondLst>
+                            <p:childTnLst>
+                              <p:par>
+                                <p:cTn id="9" presetID="1" presetClass="entr" presetSubtype="0" fill="hold" grpId="0" nodeType="clickEffect">
+                                  <p:stCondLst>
+                                    <p:cond delay="0"/>
+                                  </p:stCondLst>
+                                  <p:childTnLst>
+                                    <p:set>
+                                      <p:cBhvr>
+                                        <p:cTn id="10" dur="1" fill="hold">
+                                          <p:stCondLst>
+                                            <p:cond delay="0"/>
+                                          </p:stCondLst>
+                                        </p:cTn>
+                                        <p:tgtEl>
+                                          <p:spTgt spid="8">
+                                            <p:txEl>
+                                              <p:pRg st="0" end="0"/>
+                                            </p:txEl>
+                                          </p:spTgt>
+                                        </p:tgtEl>
+                                        <p:attrNameLst>
+                                          <p:attrName>style.visibility</p:attrName>
+                                        </p:attrNameLst>
+                                      </p:cBhvr>
+                                      <p:to>
+                                        <p:strVal val="visible"/>
+                                      </p:to>
+                                    </p:set>
+                                  </p:childTnLst>
+                                </p:cTn>
+                              </p:par>
+                            </p:childTnLst>
+                          </p:cTn>
+                        </p:par>
+                      </p:childTnLst>
+                    </p:cTn>
+                  </p:par>
+                  <p:par>
+                    <p:cTn id="11" fill="hold">
+                      <p:stCondLst>
+                        <p:cond delay="indefinite"/>
+                      </p:stCondLst>
+                      <p:childTnLst>
+                        <p:par>
+                          <p:cTn id="12" fill="hold">
+                            <p:stCondLst>
+                              <p:cond delay="0"/>
+                            </p:stCondLst>
+                            <p:childTnLst>
+                              <p:par>
+                                <p:cTn id="13" presetID="1" presetClass="entr" presetSubtype="0" fill="hold" grpId="0" nodeType="clickEffect">
+                                  <p:stCondLst>
+                                    <p:cond delay="0"/>
+                                  </p:stCondLst>
+                                  <p:childTnLst>
+                                    <p:set>
+                                      <p:cBhvr>
+                                        <p:cTn id="14" dur="1" fill="hold">
+                                          <p:stCondLst>
+                                            <p:cond delay="0"/>
+                                          </p:stCondLst>
+                                        </p:cTn>
+                                        <p:tgtEl>
+                                          <p:spTgt spid="8">
+                                            <p:txEl>
+                                              <p:pRg st="2" end="2"/>
+                                            </p:txEl>
+                                          </p:spTgt>
+                                        </p:tgtEl>
+                                        <p:attrNameLst>
+                                          <p:attrName>style.visibility</p:attrName>
+                                        </p:attrNameLst>
+                                      </p:cBhvr>
+                                      <p:to>
+                                        <p:strVal val="visible"/>
+                                      </p:to>
+                                    </p:set>
+                                  </p:childTnLst>
+                                </p:cTn>
+                              </p:par>
+                              <p:par>
+                                <p:cTn id="15" presetID="1" presetClass="entr" presetSubtype="0" fill="hold" grpId="0" nodeType="withEffect">
+                                  <p:stCondLst>
+                                    <p:cond delay="0"/>
+                                  </p:stCondLst>
+                                  <p:childTnLst>
+                                    <p:set>
+                                      <p:cBhvr>
+                                        <p:cTn id="16" dur="1" fill="hold">
+                                          <p:stCondLst>
+                                            <p:cond delay="0"/>
+                                          </p:stCondLst>
+                                        </p:cTn>
+                                        <p:tgtEl>
+                                          <p:spTgt spid="8">
+                                            <p:txEl>
+                                              <p:pRg st="3" end="3"/>
+                                            </p:txEl>
+                                          </p:spTgt>
+                                        </p:tgtEl>
+                                        <p:attrNameLst>
+                                          <p:attrName>style.visibility</p:attrName>
+                                        </p:attrNameLst>
+                                      </p:cBhvr>
+                                      <p:to>
+                                        <p:strVal val="visible"/>
+                                      </p:to>
+                                    </p:set>
+                                  </p:childTnLst>
+                                </p:cTn>
+                              </p:par>
+                            </p:childTnLst>
+                          </p:cTn>
+                        </p:par>
+                      </p:childTnLst>
+                    </p:cTn>
+                  </p:par>
+                  <p:par>
+                    <p:cTn id="17" fill="hold">
+                      <p:stCondLst>
+                        <p:cond delay="indefinite"/>
+                      </p:stCondLst>
+                      <p:childTnLst>
+                        <p:par>
+                          <p:cTn id="18" fill="hold">
+                            <p:stCondLst>
+                              <p:cond delay="0"/>
+                            </p:stCondLst>
+                            <p:childTnLst>
+                              <p:par>
+                                <p:cTn id="19" presetID="1" presetClass="entr" presetSubtype="0" fill="hold" grpId="0" nodeType="clickEffect">
+                                  <p:stCondLst>
+                                    <p:cond delay="0"/>
+                                  </p:stCondLst>
+                                  <p:childTnLst>
+                                    <p:set>
+                                      <p:cBhvr>
+                                        <p:cTn id="20" dur="1" fill="hold">
+                                          <p:stCondLst>
+                                            <p:cond delay="0"/>
+                                          </p:stCondLst>
+                                        </p:cTn>
+                                        <p:tgtEl>
+                                          <p:spTgt spid="8">
+                                            <p:txEl>
+                                              <p:pRg st="5" end="5"/>
+                                            </p:txEl>
+                                          </p:spTgt>
+                                        </p:tgtEl>
+                                        <p:attrNameLst>
+                                          <p:attrName>style.visibility</p:attrName>
+                                        </p:attrNameLst>
+                                      </p:cBhvr>
+                                      <p:to>
+                                        <p:strVal val="visible"/>
+                                      </p:to>
+                                    </p:set>
+                                  </p:childTnLst>
+                                </p:cTn>
+                              </p:par>
+                            </p:childTnLst>
+                          </p:cTn>
+                        </p:par>
+                      </p:childTnLst>
+                    </p:cTn>
+                  </p:par>
+                </p:childTnLst>
+              </p:cTn>
+              <p:prevCondLst>
+                <p:cond evt="onPrev" delay="0">
+                  <p:tgtEl>
+                    <p:sldTgt/>
+                  </p:tgtEl>
+                </p:cond>
+              </p:prevCondLst>
+              <p:nextCondLst>
+                <p:cond evt="onNext" delay="0">
+                  <p:tgtEl>
+                    <p:sldTgt/>
+                  </p:tgtEl>
+                </p:cond>
+              </p:nextCondLst>
+            </p:seq>
+          </p:childTnLst>
+        </p:cTn>
+      </p:par>
+    </p:tnLst>
+    <p:bldLst>
+      <p:bldP spid="8" grpId="0" uiExpand="1" build="p" animBg="1"/>
+    </p:bldLst>
+  </p:timing>
+</p:sld>
+</file>
+
+<file path=ppt/slides/slide5.xml><?xml version="1.0" encoding="utf-8"?>
+<p:sld xmlns:a="http://schemas.openxmlformats.org/drawingml/2006/main" xmlns:r="http://schemas.openxmlformats.org/officeDocument/2006/relationships" xmlns:p="http://schemas.openxmlformats.org/presentationml/2006/main">
+  <p:cSld>
+    <p:spTree>
+      <p:nvGrpSpPr>
+        <p:cNvPr id="1" name=""/>
+        <p:cNvGrpSpPr/>
+        <p:nvPr/>
+      </p:nvGrpSpPr>
+      <p:grpSpPr>
+        <a:xfrm>
+          <a:off x="0" y="0"/>
+          <a:ext cx="0" cy="0"/>
+          <a:chOff x="0" y="0"/>
+          <a:chExt cx="0" cy="0"/>
+        </a:xfrm>
+      </p:grpSpPr>
+      <p:sp>
+        <p:nvSpPr>
+          <p:cNvPr id="2" name="Title 1"/>
+          <p:cNvSpPr>
+            <a:spLocks noGrp="1"/>
+          </p:cNvSpPr>
+          <p:nvPr>
+            <p:ph type="title"/>
+          </p:nvPr>
+        </p:nvSpPr>
+        <p:spPr/>
+        <p:txBody>
+          <a:bodyPr>
+            <a:normAutofit/>
+          </a:bodyPr>
+          <a:lstStyle/>
+          <a:p>
+            <a:r>
+              <a:rPr lang="en-GB" dirty="0" smtClean="0"/>
+              <a:t>3. Methods for ELM control</a:t>
+            </a:r>
+            <a:endParaRPr lang="en-GB" dirty="0"/>
+          </a:p>
+        </p:txBody>
+      </p:sp>
+      <p:sp>
+        <p:nvSpPr>
+          <p:cNvPr id="4" name="Date Placeholder 3"/>
+          <p:cNvSpPr>
+            <a:spLocks noGrp="1"/>
+          </p:cNvSpPr>
+          <p:nvPr>
+            <p:ph type="dt" sz="half" idx="10"/>
+          </p:nvPr>
+        </p:nvSpPr>
+        <p:spPr/>
+        <p:txBody>
+          <a:bodyPr/>
+          <a:lstStyle/>
+          <a:p>
+            <a:r>
+              <a:rPr lang="en-GB" smtClean="0"/>
+              <a:t>31/05/2016</a:t>
+            </a:r>
+            <a:endParaRPr lang="en-GB" dirty="0"/>
+          </a:p>
+        </p:txBody>
+      </p:sp>
+      <p:sp>
+        <p:nvSpPr>
+          <p:cNvPr id="5" name="Footer Placeholder 4"/>
+          <p:cNvSpPr>
+            <a:spLocks noGrp="1"/>
+          </p:cNvSpPr>
+          <p:nvPr>
+            <p:ph type="ftr" sz="quarter" idx="11"/>
+          </p:nvPr>
+        </p:nvSpPr>
+        <p:spPr/>
+        <p:txBody>
+          <a:bodyPr/>
+          <a:lstStyle/>
+          <a:p>
+            <a:r>
+              <a:rPr lang="en-GB" smtClean="0"/>
+              <a:t>JOA509 – Frontiers of Fusion</a:t>
+            </a:r>
+            <a:endParaRPr lang="en-GB" dirty="0"/>
+          </a:p>
+        </p:txBody>
+      </p:sp>
+      <p:sp>
+        <p:nvSpPr>
+          <p:cNvPr id="6" name="Slide Number Placeholder 5"/>
+          <p:cNvSpPr>
+            <a:spLocks noGrp="1"/>
+          </p:cNvSpPr>
+          <p:nvPr>
+            <p:ph type="sldNum" sz="quarter" idx="12"/>
+          </p:nvPr>
+        </p:nvSpPr>
+        <p:spPr/>
+        <p:txBody>
+          <a:bodyPr/>
+          <a:lstStyle/>
+          <a:p>
+            <a:fld id="{581BB28B-6C27-444C-B2E2-3960C28AE47A}" type="slidenum">
+              <a:rPr lang="en-GB" smtClean="0"/>
+              <a:t>5</a:t>
+            </a:fld>
+            <a:endParaRPr lang="en-GB"/>
+          </a:p>
+        </p:txBody>
+      </p:sp>
+      <p:sp>
+        <p:nvSpPr>
+          <p:cNvPr id="8" name="Content Placeholder 7"/>
+          <p:cNvSpPr>
+            <a:spLocks noGrp="1"/>
+          </p:cNvSpPr>
+          <p:nvPr>
+            <p:ph idx="1"/>
+          </p:nvPr>
+        </p:nvSpPr>
+        <p:spPr>
+          <a:xfrm>
+            <a:off x="514350" y="1520825"/>
+            <a:ext cx="11391900" cy="1588504"/>
+          </a:xfrm>
+        </p:spPr>
+        <p:txBody>
+          <a:bodyPr/>
+          <a:lstStyle/>
+          <a:p>
+            <a:r>
+              <a:rPr lang="en-GB" dirty="0" smtClean="0"/>
+              <a:t>Several tokamaks have corroborated this scaling for ELM frequency</a:t>
+            </a:r>
+            <a:r>
+              <a:rPr lang="en-GB" dirty="0" smtClean="0"/>
+              <a:t>, </a:t>
+            </a:r>
+            <a:r>
+              <a:rPr lang="en-GB" b="1" dirty="0" err="1" smtClean="0"/>
+              <a:t>f</a:t>
+            </a:r>
+            <a:r>
+              <a:rPr lang="en-GB" b="1" baseline="-25000" dirty="0" err="1" smtClean="0"/>
+              <a:t>ELM</a:t>
+            </a:r>
+            <a:r>
+              <a:rPr lang="en-GB" dirty="0" smtClean="0"/>
+              <a:t> </a:t>
+            </a:r>
+            <a:endParaRPr lang="en-GB" dirty="0" smtClean="0"/>
+          </a:p>
+          <a:p>
+            <a:r>
+              <a:rPr lang="en-GB" b="1" dirty="0" smtClean="0"/>
+              <a:t>∆W</a:t>
+            </a:r>
+            <a:r>
+              <a:rPr lang="en-GB" b="1" baseline="-25000" dirty="0" smtClean="0"/>
+              <a:t>ELM</a:t>
+            </a:r>
+            <a:r>
+              <a:rPr lang="en-GB" b="1" dirty="0" smtClean="0"/>
+              <a:t> </a:t>
+            </a:r>
+            <a:r>
+              <a:rPr lang="en-GB" dirty="0" smtClean="0"/>
+              <a:t>is the ELM energy</a:t>
+            </a:r>
+            <a:endParaRPr lang="en-GB" b="1" dirty="0" smtClean="0"/>
+          </a:p>
+        </p:txBody>
+      </p:sp>
+      <p:pic>
+        <p:nvPicPr>
+          <p:cNvPr id="9" name="Content Placeholder 6"/>
+          <p:cNvPicPr>
+            <a:picLocks noChangeAspect="1"/>
+          </p:cNvPicPr>
+          <p:nvPr/>
+        </p:nvPicPr>
+        <p:blipFill>
+          <a:blip r:embed="rId2">
+            <a:extLst>
+              <a:ext uri="{28A0092B-C50C-407E-A947-70E740481C1C}">
+                <a14:useLocalDpi xmlns:a14="http://schemas.microsoft.com/office/drawing/2010/main" val="0"/>
+              </a:ext>
+            </a:extLst>
+          </a:blip>
+          <a:stretch>
+            <a:fillRect/>
+          </a:stretch>
+        </p:blipFill>
+        <p:spPr>
+          <a:xfrm>
+            <a:off x="838200" y="3109329"/>
+            <a:ext cx="10515600" cy="1174330"/>
+          </a:xfrm>
+          <a:prstGeom prst="rect">
+            <a:avLst/>
+          </a:prstGeom>
+        </p:spPr>
+      </p:pic>
+      <p:sp>
+        <p:nvSpPr>
+          <p:cNvPr id="10" name="TextBox 9"/>
+          <p:cNvSpPr txBox="1"/>
+          <p:nvPr/>
+        </p:nvSpPr>
+        <p:spPr>
+          <a:xfrm>
+            <a:off x="5524500" y="4283659"/>
+            <a:ext cx="5829300" cy="338554"/>
+          </a:xfrm>
+          <a:prstGeom prst="rect">
+            <a:avLst/>
+          </a:prstGeom>
+          <a:noFill/>
+        </p:spPr>
+        <p:txBody>
+          <a:bodyPr wrap="square" rtlCol="0">
+            <a:spAutoFit/>
+          </a:bodyPr>
+          <a:lstStyle/>
+          <a:p>
+            <a:r>
+              <a:rPr lang="en-GB" sz="1600" dirty="0" smtClean="0">
+                <a:latin typeface="Batang" panose="02030600000101010101" pitchFamily="18" charset="-127"/>
+                <a:ea typeface="Batang" panose="02030600000101010101" pitchFamily="18" charset="-127"/>
+              </a:rPr>
+              <a:t>A. Leonard Journal of Nuclear Materials </a:t>
+            </a:r>
+            <a:r>
+              <a:rPr lang="en-GB" sz="1600" b="1" dirty="0" smtClean="0">
+                <a:latin typeface="Batang" panose="02030600000101010101" pitchFamily="18" charset="-127"/>
+                <a:ea typeface="Batang" panose="02030600000101010101" pitchFamily="18" charset="-127"/>
+              </a:rPr>
+              <a:t>266</a:t>
+            </a:r>
+            <a:r>
+              <a:rPr lang="en-GB" sz="1600" dirty="0" smtClean="0">
+                <a:latin typeface="Batang" panose="02030600000101010101" pitchFamily="18" charset="-127"/>
+                <a:ea typeface="Batang" panose="02030600000101010101" pitchFamily="18" charset="-127"/>
+              </a:rPr>
+              <a:t> 1999</a:t>
+            </a:r>
+            <a:endParaRPr lang="en-GB" sz="1600" dirty="0">
+              <a:latin typeface="Batang" panose="02030600000101010101" pitchFamily="18" charset="-127"/>
+              <a:ea typeface="Batang" panose="02030600000101010101" pitchFamily="18" charset="-127"/>
+            </a:endParaRPr>
+          </a:p>
+        </p:txBody>
+      </p:sp>
+    </p:spTree>
+    <p:extLst>
+      <p:ext uri="{BB962C8B-B14F-4D97-AF65-F5344CB8AC3E}">
+        <p14:creationId xmlns:p14="http://schemas.microsoft.com/office/powerpoint/2010/main" val="1217640621"/>
+      </p:ext>
+    </p:extLst>
+  </p:cSld>
+  <p:clrMapOvr>
+    <a:masterClrMapping/>
+  </p:clrMapOvr>
+  <p:timing>
+    <p:tnLst>
+      <p:par>
+        <p:cTn id="1" dur="indefinite" restart="never" nodeType="tmRoot"/>
+      </p:par>
+    </p:tnLst>
+  </p:timing>
 </p:sld>
 </file>
 

</xml_diff>

<commit_message>
final Essay, PR & 1st draft presentation
</commit_message>
<xml_diff>
--- a/Presentation/elmz.pptx
+++ b/Presentation/elmz.pptx
@@ -5,14 +5,20 @@
     <p:sldMasterId id="2147483648" r:id="rId1"/>
   </p:sldMasterIdLst>
   <p:notesMasterIdLst>
-    <p:notesMasterId r:id="rId7"/>
+    <p:notesMasterId r:id="rId13"/>
   </p:notesMasterIdLst>
   <p:sldIdLst>
     <p:sldId id="256" r:id="rId2"/>
     <p:sldId id="257" r:id="rId3"/>
     <p:sldId id="258" r:id="rId4"/>
-    <p:sldId id="259" r:id="rId5"/>
-    <p:sldId id="260" r:id="rId6"/>
+    <p:sldId id="260" r:id="rId5"/>
+    <p:sldId id="259" r:id="rId6"/>
+    <p:sldId id="263" r:id="rId7"/>
+    <p:sldId id="261" r:id="rId8"/>
+    <p:sldId id="262" r:id="rId9"/>
+    <p:sldId id="264" r:id="rId10"/>
+    <p:sldId id="265" r:id="rId11"/>
+    <p:sldId id="266" r:id="rId12"/>
   </p:sldIdLst>
   <p:sldSz cx="12192000" cy="6858000"/>
   <p:notesSz cx="6858000" cy="9144000"/>
@@ -196,7 +202,7 @@
           <a:p>
             <a:fld id="{9B2D0606-C613-4473-8BAA-88EBF2A8961F}" type="datetimeFigureOut">
               <a:rPr lang="en-GB" smtClean="0"/>
-              <a:t>24/05/2016</a:t>
+              <a:t>29/05/2016</a:t>
             </a:fld>
             <a:endParaRPr lang="en-GB"/>
           </a:p>
@@ -771,47 +777,81 @@
       </p:sp>
       <p:sp>
         <p:nvSpPr>
-          <p:cNvPr id="5" name="Footer Placeholder 4"/>
-          <p:cNvSpPr>
-            <a:spLocks noGrp="1"/>
-          </p:cNvSpPr>
-          <p:nvPr>
-            <p:ph type="ftr" sz="quarter" idx="11"/>
-          </p:nvPr>
-        </p:nvSpPr>
-        <p:spPr/>
+          <p:cNvPr id="6" name="Slide Number Placeholder 5"/>
+          <p:cNvSpPr>
+            <a:spLocks noGrp="1"/>
+          </p:cNvSpPr>
+          <p:nvPr>
+            <p:ph type="sldNum" sz="quarter" idx="12"/>
+          </p:nvPr>
+        </p:nvSpPr>
+        <p:spPr>
+          <a:xfrm>
+            <a:off x="4724400" y="6365875"/>
+            <a:ext cx="2743200" cy="365125"/>
+          </a:xfrm>
+          <a:prstGeom prst="rect">
+            <a:avLst/>
+          </a:prstGeom>
+        </p:spPr>
         <p:txBody>
           <a:bodyPr/>
-          <a:lstStyle/>
+          <a:lstStyle>
+            <a:lvl1pPr algn="ctr">
+              <a:defRPr sz="1400">
+                <a:solidFill>
+                  <a:schemeClr val="tx1"/>
+                </a:solidFill>
+                <a:latin typeface="Batang" panose="02030600000101010101" pitchFamily="18" charset="-127"/>
+                <a:ea typeface="Batang" panose="02030600000101010101" pitchFamily="18" charset="-127"/>
+              </a:defRPr>
+            </a:lvl1pPr>
+          </a:lstStyle>
+          <a:p>
+            <a:fld id="{581BB28B-6C27-444C-B2E2-3960C28AE47A}" type="slidenum">
+              <a:rPr lang="en-GB" smtClean="0"/>
+              <a:pPr/>
+              <a:t>‹#›</a:t>
+            </a:fld>
+            <a:endParaRPr lang="en-GB" dirty="0"/>
+          </a:p>
+        </p:txBody>
+      </p:sp>
+      <p:sp>
+        <p:nvSpPr>
+          <p:cNvPr id="8" name="Footer Placeholder 4"/>
+          <p:cNvSpPr>
+            <a:spLocks noGrp="1"/>
+          </p:cNvSpPr>
+          <p:nvPr>
+            <p:ph type="ftr" sz="quarter" idx="3"/>
+          </p:nvPr>
+        </p:nvSpPr>
+        <p:spPr>
+          <a:xfrm>
+            <a:off x="8813800" y="6381750"/>
+            <a:ext cx="3162300" cy="365125"/>
+          </a:xfrm>
+          <a:prstGeom prst="rect">
+            <a:avLst/>
+          </a:prstGeom>
+        </p:spPr>
+        <p:txBody>
+          <a:bodyPr/>
+          <a:lstStyle>
+            <a:lvl1pPr algn="r">
+              <a:defRPr sz="1400">
+                <a:latin typeface="Baskerville Old Face" panose="02020602080505020303" pitchFamily="18" charset="0"/>
+                <a:ea typeface="Batang" panose="02030600000101010101" pitchFamily="18" charset="-127"/>
+              </a:defRPr>
+            </a:lvl1pPr>
+          </a:lstStyle>
           <a:p>
             <a:r>
               <a:rPr lang="en-GB" dirty="0" smtClean="0"/>
               <a:t>JOA509 - Frontiers of Fusion</a:t>
             </a:r>
             <a:endParaRPr lang="en-GB" dirty="0"/>
-          </a:p>
-        </p:txBody>
-      </p:sp>
-      <p:sp>
-        <p:nvSpPr>
-          <p:cNvPr id="6" name="Slide Number Placeholder 5"/>
-          <p:cNvSpPr>
-            <a:spLocks noGrp="1"/>
-          </p:cNvSpPr>
-          <p:nvPr>
-            <p:ph type="sldNum" sz="quarter" idx="12"/>
-          </p:nvPr>
-        </p:nvSpPr>
-        <p:spPr/>
-        <p:txBody>
-          <a:bodyPr/>
-          <a:lstStyle/>
-          <a:p>
-            <a:fld id="{581BB28B-6C27-444C-B2E2-3960C28AE47A}" type="slidenum">
-              <a:rPr lang="en-GB" smtClean="0"/>
-              <a:t>‹#›</a:t>
-            </a:fld>
-            <a:endParaRPr lang="en-GB"/>
           </a:p>
         </p:txBody>
       </p:sp>
@@ -993,56 +1033,78 @@
       </p:sp>
       <p:sp>
         <p:nvSpPr>
-          <p:cNvPr id="5" name="Footer Placeholder 4"/>
-          <p:cNvSpPr>
-            <a:spLocks noGrp="1"/>
-          </p:cNvSpPr>
-          <p:nvPr>
-            <p:ph type="ftr" sz="quarter" idx="11"/>
-          </p:nvPr>
-        </p:nvSpPr>
-        <p:spPr/>
+          <p:cNvPr id="8" name="Slide Number Placeholder 5"/>
+          <p:cNvSpPr>
+            <a:spLocks noGrp="1"/>
+          </p:cNvSpPr>
+          <p:nvPr>
+            <p:ph type="sldNum" sz="quarter" idx="12"/>
+          </p:nvPr>
+        </p:nvSpPr>
+        <p:spPr>
+          <a:xfrm>
+            <a:off x="4724400" y="6365875"/>
+            <a:ext cx="2743200" cy="365125"/>
+          </a:xfrm>
+        </p:spPr>
         <p:txBody>
           <a:bodyPr/>
           <a:lstStyle>
-            <a:lvl1pPr>
+            <a:lvl1pPr algn="ctr">
               <a:defRPr sz="1400">
                 <a:solidFill>
                   <a:schemeClr val="tx1"/>
                 </a:solidFill>
-                <a:latin typeface="Baskerville Old Face" panose="02020602080505020303" pitchFamily="18" charset="0"/>
+                <a:latin typeface="Batang" panose="02030600000101010101" pitchFamily="18" charset="-127"/>
+                <a:ea typeface="Batang" panose="02030600000101010101" pitchFamily="18" charset="-127"/>
               </a:defRPr>
             </a:lvl1pPr>
           </a:lstStyle>
           <a:p>
-            <a:r>
-              <a:rPr lang="en-GB" dirty="0" smtClean="0"/>
-              <a:t>JOA509 – Frontiers of Fusion</a:t>
-            </a:r>
-            <a:endParaRPr lang="en-GB" dirty="0"/>
-          </a:p>
-        </p:txBody>
-      </p:sp>
-      <p:sp>
-        <p:nvSpPr>
-          <p:cNvPr id="6" name="Slide Number Placeholder 5"/>
-          <p:cNvSpPr>
-            <a:spLocks noGrp="1"/>
-          </p:cNvSpPr>
-          <p:nvPr>
-            <p:ph type="sldNum" sz="quarter" idx="12"/>
-          </p:nvPr>
-        </p:nvSpPr>
-        <p:spPr/>
-        <p:txBody>
-          <a:bodyPr/>
-          <a:lstStyle/>
-          <a:p>
             <a:fld id="{581BB28B-6C27-444C-B2E2-3960C28AE47A}" type="slidenum">
               <a:rPr lang="en-GB" smtClean="0"/>
+              <a:pPr/>
               <a:t>‹#›</a:t>
             </a:fld>
-            <a:endParaRPr lang="en-GB"/>
+            <a:endParaRPr lang="en-GB" dirty="0"/>
+          </a:p>
+        </p:txBody>
+      </p:sp>
+      <p:sp>
+        <p:nvSpPr>
+          <p:cNvPr id="9" name="Footer Placeholder 4"/>
+          <p:cNvSpPr>
+            <a:spLocks noGrp="1"/>
+          </p:cNvSpPr>
+          <p:nvPr>
+            <p:ph type="ftr" sz="quarter" idx="3"/>
+          </p:nvPr>
+        </p:nvSpPr>
+        <p:spPr>
+          <a:xfrm>
+            <a:off x="8813800" y="6381750"/>
+            <a:ext cx="3162300" cy="365125"/>
+          </a:xfrm>
+          <a:prstGeom prst="rect">
+            <a:avLst/>
+          </a:prstGeom>
+        </p:spPr>
+        <p:txBody>
+          <a:bodyPr/>
+          <a:lstStyle>
+            <a:lvl1pPr algn="r">
+              <a:defRPr sz="1400">
+                <a:latin typeface="Baskerville Old Face" panose="02020602080505020303" pitchFamily="18" charset="0"/>
+                <a:ea typeface="Batang" panose="02030600000101010101" pitchFamily="18" charset="-127"/>
+              </a:defRPr>
+            </a:lvl1pPr>
+          </a:lstStyle>
+          <a:p>
+            <a:r>
+              <a:rPr lang="en-GB" dirty="0" smtClean="0"/>
+              <a:t>JOA509 - Frontiers of Fusion</a:t>
+            </a:r>
+            <a:endParaRPr lang="en-GB" dirty="0"/>
           </a:p>
         </p:txBody>
       </p:sp>
@@ -1131,47 +1193,78 @@
       </p:sp>
       <p:sp>
         <p:nvSpPr>
-          <p:cNvPr id="4" name="Footer Placeholder 3"/>
-          <p:cNvSpPr>
-            <a:spLocks noGrp="1"/>
-          </p:cNvSpPr>
-          <p:nvPr>
-            <p:ph type="ftr" sz="quarter" idx="11"/>
-          </p:nvPr>
-        </p:nvSpPr>
-        <p:spPr/>
+          <p:cNvPr id="7" name="Slide Number Placeholder 5"/>
+          <p:cNvSpPr>
+            <a:spLocks noGrp="1"/>
+          </p:cNvSpPr>
+          <p:nvPr>
+            <p:ph type="sldNum" sz="quarter" idx="12"/>
+          </p:nvPr>
+        </p:nvSpPr>
+        <p:spPr>
+          <a:xfrm>
+            <a:off x="4724400" y="6365875"/>
+            <a:ext cx="2743200" cy="365125"/>
+          </a:xfrm>
+        </p:spPr>
         <p:txBody>
           <a:bodyPr/>
-          <a:lstStyle/>
-          <a:p>
-            <a:r>
-              <a:rPr lang="en-GB" dirty="0" smtClean="0"/>
-              <a:t>JOA509 – Frontiers of Fusion</a:t>
-            </a:r>
-            <a:endParaRPr lang="en-GB" dirty="0"/>
-          </a:p>
-        </p:txBody>
-      </p:sp>
-      <p:sp>
-        <p:nvSpPr>
-          <p:cNvPr id="5" name="Slide Number Placeholder 4"/>
-          <p:cNvSpPr>
-            <a:spLocks noGrp="1"/>
-          </p:cNvSpPr>
-          <p:nvPr>
-            <p:ph type="sldNum" sz="quarter" idx="12"/>
-          </p:nvPr>
-        </p:nvSpPr>
-        <p:spPr/>
-        <p:txBody>
-          <a:bodyPr/>
-          <a:lstStyle/>
+          <a:lstStyle>
+            <a:lvl1pPr algn="ctr">
+              <a:defRPr sz="1400">
+                <a:solidFill>
+                  <a:schemeClr val="tx1"/>
+                </a:solidFill>
+                <a:latin typeface="Batang" panose="02030600000101010101" pitchFamily="18" charset="-127"/>
+                <a:ea typeface="Batang" panose="02030600000101010101" pitchFamily="18" charset="-127"/>
+              </a:defRPr>
+            </a:lvl1pPr>
+          </a:lstStyle>
           <a:p>
             <a:fld id="{581BB28B-6C27-444C-B2E2-3960C28AE47A}" type="slidenum">
               <a:rPr lang="en-GB" smtClean="0"/>
+              <a:pPr/>
               <a:t>‹#›</a:t>
             </a:fld>
-            <a:endParaRPr lang="en-GB"/>
+            <a:endParaRPr lang="en-GB" dirty="0"/>
+          </a:p>
+        </p:txBody>
+      </p:sp>
+      <p:sp>
+        <p:nvSpPr>
+          <p:cNvPr id="9" name="Footer Placeholder 4"/>
+          <p:cNvSpPr>
+            <a:spLocks noGrp="1"/>
+          </p:cNvSpPr>
+          <p:nvPr>
+            <p:ph type="ftr" sz="quarter" idx="3"/>
+          </p:nvPr>
+        </p:nvSpPr>
+        <p:spPr>
+          <a:xfrm>
+            <a:off x="8813800" y="6381750"/>
+            <a:ext cx="3162300" cy="365125"/>
+          </a:xfrm>
+          <a:prstGeom prst="rect">
+            <a:avLst/>
+          </a:prstGeom>
+        </p:spPr>
+        <p:txBody>
+          <a:bodyPr/>
+          <a:lstStyle>
+            <a:lvl1pPr algn="r">
+              <a:defRPr sz="1400">
+                <a:latin typeface="Baskerville Old Face" panose="02020602080505020303" pitchFamily="18" charset="0"/>
+                <a:ea typeface="Batang" panose="02030600000101010101" pitchFamily="18" charset="-127"/>
+              </a:defRPr>
+            </a:lvl1pPr>
+          </a:lstStyle>
+          <a:p>
+            <a:r>
+              <a:rPr lang="en-GB" dirty="0" smtClean="0"/>
+              <a:t>JOA509 - Frontiers of Fusion</a:t>
+            </a:r>
+            <a:endParaRPr lang="en-GB" dirty="0"/>
           </a:p>
         </p:txBody>
       </p:sp>
@@ -1185,6 +1278,13 @@
   <p:clrMapOvr>
     <a:masterClrMapping/>
   </p:clrMapOvr>
+  <p:timing>
+    <p:tnLst>
+      <p:par>
+        <p:cTn id="1" dur="indefinite" restart="never" nodeType="tmRoot"/>
+      </p:par>
+    </p:tnLst>
+  </p:timing>
 </p:sldLayout>
 </file>
 
@@ -1348,7 +1448,7 @@
           </a:lstStyle>
           <a:p>
             <a:r>
-              <a:rPr lang="en-GB" smtClean="0"/>
+              <a:rPr lang="en-GB" dirty="0" smtClean="0"/>
               <a:t>31/05/2016</a:t>
             </a:r>
             <a:endParaRPr lang="en-GB" dirty="0"/>
@@ -1357,7 +1457,7 @@
       </p:sp>
       <p:sp>
         <p:nvSpPr>
-          <p:cNvPr id="5" name="Footer Placeholder 4"/>
+          <p:cNvPr id="7" name="Footer Placeholder 4"/>
           <p:cNvSpPr>
             <a:spLocks noGrp="1"/>
           </p:cNvSpPr>
@@ -1367,72 +1467,71 @@
         </p:nvSpPr>
         <p:spPr>
           <a:xfrm>
-            <a:off x="4038600" y="6356350"/>
-            <a:ext cx="4114800" cy="365125"/>
+            <a:off x="8813800" y="6381750"/>
+            <a:ext cx="3162300" cy="365125"/>
           </a:xfrm>
           <a:prstGeom prst="rect">
             <a:avLst/>
           </a:prstGeom>
         </p:spPr>
         <p:txBody>
-          <a:bodyPr vert="horz" lIns="91440" tIns="45720" rIns="91440" bIns="45720" rtlCol="0" anchor="ctr"/>
+          <a:bodyPr/>
+          <a:lstStyle>
+            <a:lvl1pPr algn="r">
+              <a:defRPr sz="1400">
+                <a:latin typeface="Baskerville Old Face" panose="02020602080505020303" pitchFamily="18" charset="0"/>
+                <a:ea typeface="Batang" panose="02030600000101010101" pitchFamily="18" charset="-127"/>
+              </a:defRPr>
+            </a:lvl1pPr>
+          </a:lstStyle>
+          <a:p>
+            <a:r>
+              <a:rPr lang="en-GB" dirty="0" smtClean="0"/>
+              <a:t>JOA509 - Frontiers of Fusion</a:t>
+            </a:r>
+            <a:endParaRPr lang="en-GB" dirty="0"/>
+          </a:p>
+        </p:txBody>
+      </p:sp>
+      <p:sp>
+        <p:nvSpPr>
+          <p:cNvPr id="8" name="Slide Number Placeholder 5"/>
+          <p:cNvSpPr>
+            <a:spLocks noGrp="1"/>
+          </p:cNvSpPr>
+          <p:nvPr>
+            <p:ph type="sldNum" sz="quarter" idx="4"/>
+          </p:nvPr>
+        </p:nvSpPr>
+        <p:spPr>
+          <a:xfrm>
+            <a:off x="4724400" y="6365875"/>
+            <a:ext cx="2743200" cy="365125"/>
+          </a:xfrm>
+          <a:prstGeom prst="rect">
+            <a:avLst/>
+          </a:prstGeom>
+        </p:spPr>
+        <p:txBody>
+          <a:bodyPr/>
           <a:lstStyle>
             <a:lvl1pPr algn="ctr">
               <a:defRPr sz="1400">
                 <a:solidFill>
                   <a:schemeClr val="tx1"/>
                 </a:solidFill>
-                <a:latin typeface="Baskerville Old Face" panose="02020602080505020303" pitchFamily="18" charset="0"/>
+                <a:latin typeface="Batang" panose="02030600000101010101" pitchFamily="18" charset="-127"/>
+                <a:ea typeface="Batang" panose="02030600000101010101" pitchFamily="18" charset="-127"/>
               </a:defRPr>
             </a:lvl1pPr>
           </a:lstStyle>
           <a:p>
-            <a:r>
-              <a:rPr lang="en-GB" dirty="0" smtClean="0"/>
-              <a:t>JOA509 - Frontiers of Fusion</a:t>
-            </a:r>
-            <a:endParaRPr lang="en-GB" dirty="0"/>
-          </a:p>
-        </p:txBody>
-      </p:sp>
-      <p:sp>
-        <p:nvSpPr>
-          <p:cNvPr id="6" name="Slide Number Placeholder 5"/>
-          <p:cNvSpPr>
-            <a:spLocks noGrp="1"/>
-          </p:cNvSpPr>
-          <p:nvPr>
-            <p:ph type="sldNum" sz="quarter" idx="4"/>
-          </p:nvPr>
-        </p:nvSpPr>
-        <p:spPr>
-          <a:xfrm>
-            <a:off x="8610600" y="6356350"/>
-            <a:ext cx="2743200" cy="365125"/>
-          </a:xfrm>
-          <a:prstGeom prst="rect">
-            <a:avLst/>
-          </a:prstGeom>
-        </p:spPr>
-        <p:txBody>
-          <a:bodyPr vert="horz" lIns="91440" tIns="45720" rIns="91440" bIns="45720" rtlCol="0" anchor="ctr"/>
-          <a:lstStyle>
-            <a:lvl1pPr algn="r">
-              <a:defRPr sz="1200">
-                <a:solidFill>
-                  <a:schemeClr val="tx1">
-                    <a:tint val="75000"/>
-                  </a:schemeClr>
-                </a:solidFill>
-              </a:defRPr>
-            </a:lvl1pPr>
-          </a:lstStyle>
-          <a:p>
             <a:fld id="{581BB28B-6C27-444C-B2E2-3960C28AE47A}" type="slidenum">
               <a:rPr lang="en-GB" smtClean="0"/>
+              <a:pPr/>
               <a:t>‹#›</a:t>
             </a:fld>
-            <a:endParaRPr lang="en-GB"/>
+            <a:endParaRPr lang="en-GB" dirty="0"/>
           </a:p>
         </p:txBody>
       </p:sp>
@@ -1844,10 +1943,15 @@
             <a:spLocks noGrp="1"/>
           </p:cNvSpPr>
           <p:nvPr>
-            <p:ph type="ftr" sz="quarter" idx="11"/>
-          </p:nvPr>
-        </p:nvSpPr>
-        <p:spPr/>
+            <p:ph type="ftr" sz="quarter" idx="3"/>
+          </p:nvPr>
+        </p:nvSpPr>
+        <p:spPr>
+          <a:xfrm>
+            <a:off x="8813800" y="6381750"/>
+            <a:ext cx="3162300" cy="365125"/>
+          </a:xfrm>
+        </p:spPr>
         <p:txBody>
           <a:bodyPr/>
           <a:lstStyle/>
@@ -1880,10 +1984,22 @@
           <a:lstStyle/>
           <a:p>
             <a:fld id="{581BB28B-6C27-444C-B2E2-3960C28AE47A}" type="slidenum">
-              <a:rPr lang="en-GB" smtClean="0"/>
+              <a:rPr lang="en-GB" sz="1400" smtClean="0">
+                <a:solidFill>
+                  <a:schemeClr val="tx1"/>
+                </a:solidFill>
+                <a:latin typeface="Batang" panose="02030600000101010101" pitchFamily="18" charset="-127"/>
+                <a:ea typeface="Batang" panose="02030600000101010101" pitchFamily="18" charset="-127"/>
+              </a:rPr>
               <a:t>1</a:t>
             </a:fld>
-            <a:endParaRPr lang="en-GB"/>
+            <a:endParaRPr lang="en-GB" dirty="0">
+              <a:solidFill>
+                <a:schemeClr val="tx1"/>
+              </a:solidFill>
+              <a:latin typeface="Batang" panose="02030600000101010101" pitchFamily="18" charset="-127"/>
+              <a:ea typeface="Batang" panose="02030600000101010101" pitchFamily="18" charset="-127"/>
+            </a:endParaRPr>
           </a:p>
         </p:txBody>
       </p:sp>
@@ -1914,6 +2030,696 @@
     <p:extLst>
       <p:ext uri="{BB962C8B-B14F-4D97-AF65-F5344CB8AC3E}">
         <p14:creationId xmlns:p14="http://schemas.microsoft.com/office/powerpoint/2010/main" val="3373391198"/>
+      </p:ext>
+    </p:extLst>
+  </p:cSld>
+  <p:clrMapOvr>
+    <a:masterClrMapping/>
+  </p:clrMapOvr>
+  <p:timing>
+    <p:tnLst>
+      <p:par>
+        <p:cTn id="1" dur="indefinite" restart="never" nodeType="tmRoot"/>
+      </p:par>
+    </p:tnLst>
+  </p:timing>
+</p:sld>
+</file>
+
+<file path=ppt/slides/slide10.xml><?xml version="1.0" encoding="utf-8"?>
+<p:sld xmlns:a="http://schemas.openxmlformats.org/drawingml/2006/main" xmlns:r="http://schemas.openxmlformats.org/officeDocument/2006/relationships" xmlns:p="http://schemas.openxmlformats.org/presentationml/2006/main">
+  <p:cSld>
+    <p:spTree>
+      <p:nvGrpSpPr>
+        <p:cNvPr id="1" name=""/>
+        <p:cNvGrpSpPr/>
+        <p:nvPr/>
+      </p:nvGrpSpPr>
+      <p:grpSpPr>
+        <a:xfrm>
+          <a:off x="0" y="0"/>
+          <a:ext cx="0" cy="0"/>
+          <a:chOff x="0" y="0"/>
+          <a:chExt cx="0" cy="0"/>
+        </a:xfrm>
+      </p:grpSpPr>
+      <p:grpSp>
+        <p:nvGrpSpPr>
+          <p:cNvPr id="8" name="Group 7"/>
+          <p:cNvGrpSpPr/>
+          <p:nvPr/>
+        </p:nvGrpSpPr>
+        <p:grpSpPr>
+          <a:xfrm>
+            <a:off x="1381125" y="-1731783"/>
+            <a:ext cx="9597571" cy="8008758"/>
+            <a:chOff x="1381125" y="-1731783"/>
+            <a:chExt cx="9597571" cy="8008758"/>
+          </a:xfrm>
+        </p:grpSpPr>
+        <p:pic>
+          <p:nvPicPr>
+            <p:cNvPr id="3074" name="Picture 2" descr="C:\Users\joe\Documents\GitHub\FFessay\Presentation\podium.jpg"/>
+            <p:cNvPicPr>
+              <a:picLocks noChangeAspect="1" noChangeArrowheads="1"/>
+            </p:cNvPicPr>
+            <p:nvPr/>
+          </p:nvPicPr>
+          <p:blipFill>
+            <a:blip r:embed="rId2">
+              <a:extLst>
+                <a:ext uri="{28A0092B-C50C-407E-A947-70E740481C1C}">
+                  <a14:useLocalDpi xmlns:a14="http://schemas.microsoft.com/office/drawing/2010/main" val="0"/>
+                </a:ext>
+              </a:extLst>
+            </a:blip>
+            <a:srcRect/>
+            <a:stretch>
+              <a:fillRect/>
+            </a:stretch>
+          </p:blipFill>
+          <p:spPr bwMode="auto">
+            <a:xfrm>
+              <a:off x="1381125" y="0"/>
+              <a:ext cx="9429750" cy="6276975"/>
+            </a:xfrm>
+            <a:prstGeom prst="rect">
+              <a:avLst/>
+            </a:prstGeom>
+            <a:noFill/>
+            <a:extLst>
+              <a:ext uri="{909E8E84-426E-40DD-AFC4-6F175D3DCCD1}">
+                <a14:hiddenFill xmlns:a14="http://schemas.microsoft.com/office/drawing/2010/main">
+                  <a:solidFill>
+                    <a:srgbClr val="FFFFFF"/>
+                  </a:solidFill>
+                </a14:hiddenFill>
+              </a:ext>
+            </a:extLst>
+          </p:spPr>
+        </p:pic>
+        <p:pic>
+          <p:nvPicPr>
+            <p:cNvPr id="3078" name="Picture 6" descr="http://luguelinsantos.com/imagenes/home/medal.png"/>
+            <p:cNvPicPr>
+              <a:picLocks noChangeAspect="1" noChangeArrowheads="1"/>
+            </p:cNvPicPr>
+            <p:nvPr/>
+          </p:nvPicPr>
+          <p:blipFill>
+            <a:blip r:embed="rId3">
+              <a:extLst>
+                <a:ext uri="{28A0092B-C50C-407E-A947-70E740481C1C}">
+                  <a14:useLocalDpi xmlns:a14="http://schemas.microsoft.com/office/drawing/2010/main" val="0"/>
+                </a:ext>
+              </a:extLst>
+            </a:blip>
+            <a:srcRect/>
+            <a:stretch>
+              <a:fillRect/>
+            </a:stretch>
+          </p:blipFill>
+          <p:spPr bwMode="auto">
+            <a:xfrm>
+              <a:off x="1381125" y="-46922"/>
+              <a:ext cx="1892830" cy="2781302"/>
+            </a:xfrm>
+            <a:prstGeom prst="rect">
+              <a:avLst/>
+            </a:prstGeom>
+            <a:noFill/>
+            <a:extLst>
+              <a:ext uri="{909E8E84-426E-40DD-AFC4-6F175D3DCCD1}">
+                <a14:hiddenFill xmlns:a14="http://schemas.microsoft.com/office/drawing/2010/main">
+                  <a:solidFill>
+                    <a:srgbClr val="FFFFFF"/>
+                  </a:solidFill>
+                </a14:hiddenFill>
+              </a:ext>
+            </a:extLst>
+          </p:spPr>
+        </p:pic>
+        <p:pic>
+          <p:nvPicPr>
+            <p:cNvPr id="13" name="Picture 2" descr="C:\Users\joe\Documents\GitHub\FFessay\Presentation\podium.jpg"/>
+            <p:cNvPicPr>
+              <a:picLocks noChangeAspect="1" noChangeArrowheads="1"/>
+            </p:cNvPicPr>
+            <p:nvPr/>
+          </p:nvPicPr>
+          <p:blipFill rotWithShape="1">
+            <a:blip r:embed="rId2">
+              <a:extLst>
+                <a:ext uri="{28A0092B-C50C-407E-A947-70E740481C1C}">
+                  <a14:useLocalDpi xmlns:a14="http://schemas.microsoft.com/office/drawing/2010/main" val="0"/>
+                </a:ext>
+              </a:extLst>
+            </a:blip>
+            <a:srcRect l="37114" t="10849" r="39394" b="26373"/>
+            <a:stretch/>
+          </p:blipFill>
+          <p:spPr bwMode="auto">
+            <a:xfrm>
+              <a:off x="4933269" y="1371599"/>
+              <a:ext cx="2215243" cy="3940629"/>
+            </a:xfrm>
+            <a:prstGeom prst="rect">
+              <a:avLst/>
+            </a:prstGeom>
+            <a:noFill/>
+            <a:extLst>
+              <a:ext uri="{909E8E84-426E-40DD-AFC4-6F175D3DCCD1}">
+                <a14:hiddenFill xmlns:a14="http://schemas.microsoft.com/office/drawing/2010/main">
+                  <a:solidFill>
+                    <a:srgbClr val="FFFFFF"/>
+                  </a:solidFill>
+                </a14:hiddenFill>
+              </a:ext>
+            </a:extLst>
+          </p:spPr>
+        </p:pic>
+        <p:pic>
+          <p:nvPicPr>
+            <p:cNvPr id="3076" name="Picture 4" descr="http://media.boingboing.net/wp-content/uploads/2012/07/2012.jpeg"/>
+            <p:cNvPicPr>
+              <a:picLocks noChangeAspect="1" noChangeArrowheads="1"/>
+            </p:cNvPicPr>
+            <p:nvPr/>
+          </p:nvPicPr>
+          <p:blipFill rotWithShape="1">
+            <a:blip r:embed="rId4">
+              <a:extLst>
+                <a:ext uri="{BEBA8EAE-BF5A-486C-A8C5-ECC9F3942E4B}">
+                  <a14:imgProps xmlns:a14="http://schemas.microsoft.com/office/drawing/2010/main">
+                    <a14:imgLayer r:embed="rId5">
+                      <a14:imgEffect>
+                        <a14:backgroundRemoval t="0" b="100000" l="50905" r="98869"/>
+                      </a14:imgEffect>
+                    </a14:imgLayer>
+                  </a14:imgProps>
+                </a:ext>
+                <a:ext uri="{28A0092B-C50C-407E-A947-70E740481C1C}">
+                  <a14:useLocalDpi xmlns:a14="http://schemas.microsoft.com/office/drawing/2010/main" val="0"/>
+                </a:ext>
+              </a:extLst>
+            </a:blip>
+            <a:srcRect l="50000"/>
+            <a:stretch/>
+          </p:blipFill>
+          <p:spPr bwMode="auto">
+            <a:xfrm>
+              <a:off x="4760457" y="-438800"/>
+              <a:ext cx="2105025" cy="2133601"/>
+            </a:xfrm>
+            <a:prstGeom prst="rect">
+              <a:avLst/>
+            </a:prstGeom>
+            <a:noFill/>
+            <a:extLst>
+              <a:ext uri="{909E8E84-426E-40DD-AFC4-6F175D3DCCD1}">
+                <a14:hiddenFill xmlns:a14="http://schemas.microsoft.com/office/drawing/2010/main">
+                  <a:solidFill>
+                    <a:srgbClr val="FFFFFF"/>
+                  </a:solidFill>
+                </a14:hiddenFill>
+              </a:ext>
+            </a:extLst>
+          </p:spPr>
+        </p:pic>
+        <p:pic>
+          <p:nvPicPr>
+            <p:cNvPr id="3080" name="Picture 8" descr="http://resources3.news.com.au/images/2012/07/02/1226414/231123-bronze-olympic-medal.jpg"/>
+            <p:cNvPicPr>
+              <a:picLocks noChangeAspect="1" noChangeArrowheads="1"/>
+            </p:cNvPicPr>
+            <p:nvPr/>
+          </p:nvPicPr>
+          <p:blipFill>
+            <a:blip r:embed="rId6">
+              <a:extLst>
+                <a:ext uri="{BEBA8EAE-BF5A-486C-A8C5-ECC9F3942E4B}">
+                  <a14:imgProps xmlns:a14="http://schemas.microsoft.com/office/drawing/2010/main">
+                    <a14:imgLayer r:embed="rId7">
+                      <a14:imgEffect>
+                        <a14:backgroundRemoval t="9836" b="93648" l="9836" r="89891"/>
+                      </a14:imgEffect>
+                    </a14:imgLayer>
+                  </a14:imgProps>
+                </a:ext>
+                <a:ext uri="{28A0092B-C50C-407E-A947-70E740481C1C}">
+                  <a14:useLocalDpi xmlns:a14="http://schemas.microsoft.com/office/drawing/2010/main" val="0"/>
+                </a:ext>
+              </a:extLst>
+            </a:blip>
+            <a:srcRect/>
+            <a:stretch>
+              <a:fillRect/>
+            </a:stretch>
+          </p:blipFill>
+          <p:spPr bwMode="auto">
+            <a:xfrm>
+              <a:off x="7492546" y="-1731783"/>
+              <a:ext cx="3486150" cy="4648201"/>
+            </a:xfrm>
+            <a:prstGeom prst="rect">
+              <a:avLst/>
+            </a:prstGeom>
+            <a:noFill/>
+            <a:extLst>
+              <a:ext uri="{909E8E84-426E-40DD-AFC4-6F175D3DCCD1}">
+                <a14:hiddenFill xmlns:a14="http://schemas.microsoft.com/office/drawing/2010/main">
+                  <a:solidFill>
+                    <a:srgbClr val="FFFFFF"/>
+                  </a:solidFill>
+                </a14:hiddenFill>
+              </a:ext>
+            </a:extLst>
+          </p:spPr>
+        </p:pic>
+      </p:grpSp>
+      <p:sp>
+        <p:nvSpPr>
+          <p:cNvPr id="4" name="Date Placeholder 3"/>
+          <p:cNvSpPr>
+            <a:spLocks noGrp="1"/>
+          </p:cNvSpPr>
+          <p:nvPr>
+            <p:ph type="dt" sz="half" idx="10"/>
+          </p:nvPr>
+        </p:nvSpPr>
+        <p:spPr/>
+        <p:txBody>
+          <a:bodyPr/>
+          <a:lstStyle/>
+          <a:p>
+            <a:r>
+              <a:rPr lang="en-GB" smtClean="0"/>
+              <a:t>31/05/2016</a:t>
+            </a:r>
+            <a:endParaRPr lang="en-GB" dirty="0"/>
+          </a:p>
+        </p:txBody>
+      </p:sp>
+      <p:sp>
+        <p:nvSpPr>
+          <p:cNvPr id="5" name="Footer Placeholder 4"/>
+          <p:cNvSpPr>
+            <a:spLocks noGrp="1"/>
+          </p:cNvSpPr>
+          <p:nvPr>
+            <p:ph type="ftr" sz="quarter" idx="3"/>
+          </p:nvPr>
+        </p:nvSpPr>
+        <p:spPr>
+          <a:xfrm>
+            <a:off x="7912100" y="6343650"/>
+            <a:ext cx="4114800" cy="365125"/>
+          </a:xfrm>
+        </p:spPr>
+        <p:txBody>
+          <a:bodyPr/>
+          <a:lstStyle/>
+          <a:p>
+            <a:r>
+              <a:rPr lang="en-GB" smtClean="0"/>
+              <a:t>JOA509 – Frontiers of Fusion</a:t>
+            </a:r>
+            <a:endParaRPr lang="en-GB" dirty="0"/>
+          </a:p>
+        </p:txBody>
+      </p:sp>
+      <p:sp>
+        <p:nvSpPr>
+          <p:cNvPr id="6" name="Slide Number Placeholder 5"/>
+          <p:cNvSpPr>
+            <a:spLocks noGrp="1"/>
+          </p:cNvSpPr>
+          <p:nvPr>
+            <p:ph type="sldNum" sz="quarter" idx="12"/>
+          </p:nvPr>
+        </p:nvSpPr>
+        <p:spPr>
+          <a:xfrm>
+            <a:off x="8610600" y="6356350"/>
+            <a:ext cx="2743200" cy="365125"/>
+          </a:xfrm>
+        </p:spPr>
+        <p:txBody>
+          <a:bodyPr/>
+          <a:lstStyle/>
+          <a:p>
+            <a:fld id="{581BB28B-6C27-444C-B2E2-3960C28AE47A}" type="slidenum">
+              <a:rPr lang="en-GB" smtClean="0"/>
+              <a:t>10</a:t>
+            </a:fld>
+            <a:endParaRPr lang="en-GB"/>
+          </a:p>
+        </p:txBody>
+      </p:sp>
+      <p:sp>
+        <p:nvSpPr>
+          <p:cNvPr id="10" name="TextBox 9"/>
+          <p:cNvSpPr txBox="1"/>
+          <p:nvPr/>
+        </p:nvSpPr>
+        <p:spPr>
+          <a:xfrm>
+            <a:off x="381000" y="2843634"/>
+            <a:ext cx="3714750" cy="1940957"/>
+          </a:xfrm>
+          <a:prstGeom prst="roundRect">
+            <a:avLst/>
+          </a:prstGeom>
+          <a:solidFill>
+            <a:schemeClr val="bg1">
+              <a:lumMod val="85000"/>
+            </a:schemeClr>
+          </a:solidFill>
+          <a:ln>
+            <a:solidFill>
+              <a:schemeClr val="tx1"/>
+            </a:solidFill>
+          </a:ln>
+        </p:spPr>
+        <p:txBody>
+          <a:bodyPr wrap="square" rtlCol="0">
+            <a:spAutoFit/>
+          </a:bodyPr>
+          <a:lstStyle/>
+          <a:p>
+            <a:r>
+              <a:rPr lang="en-GB" sz="3600" b="1" dirty="0" smtClean="0">
+                <a:latin typeface="Baskerville Old Face" panose="02020602080505020303" pitchFamily="18" charset="0"/>
+              </a:rPr>
+              <a:t>2</a:t>
+            </a:r>
+            <a:r>
+              <a:rPr lang="en-GB" sz="3600" b="1" baseline="30000" dirty="0" smtClean="0">
+                <a:latin typeface="Baskerville Old Face" panose="02020602080505020303" pitchFamily="18" charset="0"/>
+              </a:rPr>
+              <a:t>nd</a:t>
+            </a:r>
+            <a:r>
+              <a:rPr lang="en-GB" sz="3600" b="1" dirty="0" smtClean="0">
+                <a:latin typeface="Baskerville Old Face" panose="02020602080505020303" pitchFamily="18" charset="0"/>
+              </a:rPr>
+              <a:t>: Partial RMP suppression + VK/PI mitigation</a:t>
+            </a:r>
+            <a:endParaRPr lang="en-GB" sz="3600" b="1" dirty="0">
+              <a:latin typeface="Baskerville Old Face" panose="02020602080505020303" pitchFamily="18" charset="0"/>
+            </a:endParaRPr>
+          </a:p>
+        </p:txBody>
+      </p:sp>
+      <p:sp>
+        <p:nvSpPr>
+          <p:cNvPr id="11" name="TextBox 10"/>
+          <p:cNvSpPr txBox="1"/>
+          <p:nvPr/>
+        </p:nvSpPr>
+        <p:spPr>
+          <a:xfrm>
+            <a:off x="7810500" y="3028647"/>
+            <a:ext cx="3714750" cy="2553891"/>
+          </a:xfrm>
+          <a:prstGeom prst="roundRect">
+            <a:avLst/>
+          </a:prstGeom>
+          <a:solidFill>
+            <a:schemeClr val="accent2"/>
+          </a:solidFill>
+          <a:ln>
+            <a:solidFill>
+              <a:schemeClr val="tx1"/>
+            </a:solidFill>
+          </a:ln>
+        </p:spPr>
+        <p:txBody>
+          <a:bodyPr wrap="square" rtlCol="0">
+            <a:spAutoFit/>
+          </a:bodyPr>
+          <a:lstStyle/>
+          <a:p>
+            <a:r>
+              <a:rPr lang="en-GB" sz="3600" b="1" dirty="0" smtClean="0">
+                <a:latin typeface="Baskerville Old Face" panose="02020602080505020303" pitchFamily="18" charset="0"/>
+              </a:rPr>
+              <a:t>3</a:t>
+            </a:r>
+            <a:r>
+              <a:rPr lang="en-GB" sz="3600" b="1" baseline="30000" dirty="0" smtClean="0">
+                <a:latin typeface="Baskerville Old Face" panose="02020602080505020303" pitchFamily="18" charset="0"/>
+              </a:rPr>
+              <a:t>rd</a:t>
+            </a:r>
+            <a:r>
+              <a:rPr lang="en-GB" sz="3600" b="1" dirty="0" smtClean="0">
+                <a:latin typeface="Baskerville Old Face" panose="02020602080505020303" pitchFamily="18" charset="0"/>
+              </a:rPr>
+              <a:t>: Sustained VK/PI mitigation with </a:t>
+            </a:r>
+            <a:r>
+              <a:rPr lang="en-GB" sz="3600" b="1" dirty="0" err="1" smtClean="0">
+                <a:latin typeface="Baskerville Old Face" panose="02020602080505020303" pitchFamily="18" charset="0"/>
+              </a:rPr>
+              <a:t>f</a:t>
+            </a:r>
+            <a:r>
+              <a:rPr lang="en-GB" sz="3600" b="1" baseline="-25000" dirty="0" err="1" smtClean="0">
+                <a:latin typeface="Baskerville Old Face" panose="02020602080505020303" pitchFamily="18" charset="0"/>
+              </a:rPr>
+              <a:t>ELM</a:t>
+            </a:r>
+            <a:r>
+              <a:rPr lang="en-GB" sz="3600" b="1" dirty="0" smtClean="0">
+                <a:latin typeface="Baskerville Old Face" panose="02020602080505020303" pitchFamily="18" charset="0"/>
+              </a:rPr>
+              <a:t> above threshold</a:t>
+            </a:r>
+            <a:endParaRPr lang="en-GB" sz="3600" b="1" dirty="0">
+              <a:latin typeface="Baskerville Old Face" panose="02020602080505020303" pitchFamily="18" charset="0"/>
+            </a:endParaRPr>
+          </a:p>
+        </p:txBody>
+      </p:sp>
+      <p:sp>
+        <p:nvSpPr>
+          <p:cNvPr id="7" name="TextBox 6"/>
+          <p:cNvSpPr txBox="1"/>
+          <p:nvPr/>
+        </p:nvSpPr>
+        <p:spPr>
+          <a:xfrm>
+            <a:off x="4133850" y="2269279"/>
+            <a:ext cx="3714750" cy="2145268"/>
+          </a:xfrm>
+          <a:prstGeom prst="roundRect">
+            <a:avLst/>
+          </a:prstGeom>
+          <a:solidFill>
+            <a:schemeClr val="accent4"/>
+          </a:solidFill>
+          <a:ln>
+            <a:solidFill>
+              <a:schemeClr val="tx1"/>
+            </a:solidFill>
+          </a:ln>
+        </p:spPr>
+        <p:txBody>
+          <a:bodyPr wrap="square" rtlCol="0">
+            <a:spAutoFit/>
+          </a:bodyPr>
+          <a:lstStyle/>
+          <a:p>
+            <a:r>
+              <a:rPr lang="en-GB" sz="4000" b="1" dirty="0" smtClean="0">
+                <a:latin typeface="Baskerville Old Face" panose="02020602080505020303" pitchFamily="18" charset="0"/>
+              </a:rPr>
+              <a:t>1</a:t>
+            </a:r>
+            <a:r>
+              <a:rPr lang="en-GB" sz="4000" b="1" baseline="30000" dirty="0" smtClean="0">
+                <a:latin typeface="Baskerville Old Face" panose="02020602080505020303" pitchFamily="18" charset="0"/>
+              </a:rPr>
+              <a:t>st</a:t>
+            </a:r>
+            <a:r>
+              <a:rPr lang="en-GB" sz="4000" b="1" dirty="0" smtClean="0">
+                <a:latin typeface="Baskerville Old Face" panose="02020602080505020303" pitchFamily="18" charset="0"/>
+              </a:rPr>
+              <a:t>: Complete, sustained RMP suppression</a:t>
+            </a:r>
+            <a:endParaRPr lang="en-GB" sz="4000" b="1" dirty="0">
+              <a:latin typeface="Baskerville Old Face" panose="02020602080505020303" pitchFamily="18" charset="0"/>
+            </a:endParaRPr>
+          </a:p>
+        </p:txBody>
+      </p:sp>
+    </p:spTree>
+    <p:extLst>
+      <p:ext uri="{BB962C8B-B14F-4D97-AF65-F5344CB8AC3E}">
+        <p14:creationId xmlns:p14="http://schemas.microsoft.com/office/powerpoint/2010/main" val="45514725"/>
+      </p:ext>
+    </p:extLst>
+  </p:cSld>
+  <p:clrMapOvr>
+    <a:masterClrMapping/>
+  </p:clrMapOvr>
+  <p:timing>
+    <p:tnLst>
+      <p:par>
+        <p:cTn id="1" dur="indefinite" restart="never" nodeType="tmRoot"/>
+      </p:par>
+    </p:tnLst>
+  </p:timing>
+</p:sld>
+</file>
+
+<file path=ppt/slides/slide11.xml><?xml version="1.0" encoding="utf-8"?>
+<p:sld xmlns:a="http://schemas.openxmlformats.org/drawingml/2006/main" xmlns:r="http://schemas.openxmlformats.org/officeDocument/2006/relationships" xmlns:p="http://schemas.openxmlformats.org/presentationml/2006/main">
+  <p:cSld>
+    <p:spTree>
+      <p:nvGrpSpPr>
+        <p:cNvPr id="1" name=""/>
+        <p:cNvGrpSpPr/>
+        <p:nvPr/>
+      </p:nvGrpSpPr>
+      <p:grpSpPr>
+        <a:xfrm>
+          <a:off x="0" y="0"/>
+          <a:ext cx="0" cy="0"/>
+          <a:chOff x="0" y="0"/>
+          <a:chExt cx="0" cy="0"/>
+        </a:xfrm>
+      </p:grpSpPr>
+      <p:sp>
+        <p:nvSpPr>
+          <p:cNvPr id="2" name="Title 1"/>
+          <p:cNvSpPr>
+            <a:spLocks noGrp="1"/>
+          </p:cNvSpPr>
+          <p:nvPr>
+            <p:ph type="title"/>
+          </p:nvPr>
+        </p:nvSpPr>
+        <p:spPr/>
+        <p:txBody>
+          <a:bodyPr/>
+          <a:lstStyle/>
+          <a:p>
+            <a:r>
+              <a:rPr lang="en-GB" b="1" dirty="0"/>
+              <a:t>4</a:t>
+            </a:r>
+            <a:r>
+              <a:rPr lang="en-GB" dirty="0"/>
+              <a:t>. ELM control on ITER</a:t>
+            </a:r>
+          </a:p>
+        </p:txBody>
+      </p:sp>
+      <p:sp>
+        <p:nvSpPr>
+          <p:cNvPr id="3" name="Content Placeholder 2"/>
+          <p:cNvSpPr>
+            <a:spLocks noGrp="1"/>
+          </p:cNvSpPr>
+          <p:nvPr>
+            <p:ph idx="1"/>
+          </p:nvPr>
+        </p:nvSpPr>
+        <p:spPr/>
+        <p:txBody>
+          <a:bodyPr/>
+          <a:lstStyle/>
+          <a:p>
+            <a:endParaRPr lang="en-GB"/>
+          </a:p>
+        </p:txBody>
+      </p:sp>
+      <p:sp>
+        <p:nvSpPr>
+          <p:cNvPr id="4" name="Date Placeholder 3"/>
+          <p:cNvSpPr>
+            <a:spLocks noGrp="1"/>
+          </p:cNvSpPr>
+          <p:nvPr>
+            <p:ph type="dt" sz="half" idx="10"/>
+          </p:nvPr>
+        </p:nvSpPr>
+        <p:spPr/>
+        <p:txBody>
+          <a:bodyPr/>
+          <a:lstStyle/>
+          <a:p>
+            <a:r>
+              <a:rPr lang="en-GB" smtClean="0"/>
+              <a:t>31/05/2016</a:t>
+            </a:r>
+            <a:endParaRPr lang="en-GB" dirty="0"/>
+          </a:p>
+        </p:txBody>
+      </p:sp>
+      <p:sp>
+        <p:nvSpPr>
+          <p:cNvPr id="5" name="Footer Placeholder 4"/>
+          <p:cNvSpPr>
+            <a:spLocks noGrp="1"/>
+          </p:cNvSpPr>
+          <p:nvPr>
+            <p:ph type="ftr" sz="quarter" idx="3"/>
+          </p:nvPr>
+        </p:nvSpPr>
+        <p:spPr>
+          <a:xfrm>
+            <a:off x="7912100" y="6343650"/>
+            <a:ext cx="4114800" cy="365125"/>
+          </a:xfrm>
+        </p:spPr>
+        <p:txBody>
+          <a:bodyPr/>
+          <a:lstStyle/>
+          <a:p>
+            <a:r>
+              <a:rPr lang="en-GB" smtClean="0"/>
+              <a:t>JOA509 – Frontiers of Fusion</a:t>
+            </a:r>
+            <a:endParaRPr lang="en-GB" dirty="0"/>
+          </a:p>
+        </p:txBody>
+      </p:sp>
+      <p:sp>
+        <p:nvSpPr>
+          <p:cNvPr id="6" name="Slide Number Placeholder 5"/>
+          <p:cNvSpPr>
+            <a:spLocks noGrp="1"/>
+          </p:cNvSpPr>
+          <p:nvPr>
+            <p:ph type="sldNum" sz="quarter" idx="12"/>
+          </p:nvPr>
+        </p:nvSpPr>
+        <p:spPr>
+          <a:xfrm>
+            <a:off x="8610600" y="6356350"/>
+            <a:ext cx="2743200" cy="365125"/>
+          </a:xfrm>
+        </p:spPr>
+        <p:txBody>
+          <a:bodyPr/>
+          <a:lstStyle/>
+          <a:p>
+            <a:fld id="{581BB28B-6C27-444C-B2E2-3960C28AE47A}" type="slidenum">
+              <a:rPr lang="en-GB" smtClean="0"/>
+              <a:t>11</a:t>
+            </a:fld>
+            <a:endParaRPr lang="en-GB"/>
+          </a:p>
+        </p:txBody>
+      </p:sp>
+    </p:spTree>
+    <p:extLst>
+      <p:ext uri="{BB962C8B-B14F-4D97-AF65-F5344CB8AC3E}">
+        <p14:creationId xmlns:p14="http://schemas.microsoft.com/office/powerpoint/2010/main" val="966544146"/>
       </p:ext>
     </p:extLst>
   </p:cSld>
@@ -1998,7 +2804,15 @@
             </a:pPr>
             <a:r>
               <a:rPr lang="en-GB" dirty="0" smtClean="0"/>
-              <a:t>Background understanding of Edge Localised Modes (</a:t>
+              <a:t>Background understanding </a:t>
+            </a:r>
+            <a:r>
+              <a:rPr lang="en-GB" dirty="0" smtClean="0"/>
+              <a:t>of type-I </a:t>
+            </a:r>
+            <a:r>
+              <a:rPr lang="en-GB" dirty="0" smtClean="0"/>
+              <a:t>Edge Localised Modes (</a:t>
             </a:r>
             <a:r>
               <a:rPr lang="en-GB" sz="3600" b="1" dirty="0" smtClean="0"/>
@@ -2016,8 +2830,13 @@
             </a:pPr>
             <a:r>
               <a:rPr lang="en-GB" dirty="0" smtClean="0"/>
-              <a:t>Problems ELMs cause</a:t>
-            </a:r>
+              <a:t>Problems ELMs </a:t>
+            </a:r>
+            <a:r>
+              <a:rPr lang="en-GB" dirty="0" smtClean="0"/>
+              <a:t>cause &amp; ITER’s requirements</a:t>
+            </a:r>
+            <a:endParaRPr lang="en-GB" dirty="0" smtClean="0"/>
           </a:p>
           <a:p>
             <a:pPr marL="514350" indent="-514350">
@@ -2085,10 +2904,15 @@
             <a:spLocks noGrp="1"/>
           </p:cNvSpPr>
           <p:nvPr>
-            <p:ph type="ftr" sz="quarter" idx="11"/>
-          </p:nvPr>
-        </p:nvSpPr>
-        <p:spPr/>
+            <p:ph type="ftr" sz="quarter" idx="3"/>
+          </p:nvPr>
+        </p:nvSpPr>
+        <p:spPr>
+          <a:xfrm>
+            <a:off x="7912100" y="6343650"/>
+            <a:ext cx="4114800" cy="365125"/>
+          </a:xfrm>
+        </p:spPr>
         <p:txBody>
           <a:bodyPr/>
           <a:lstStyle/>
@@ -2097,7 +2921,6 @@
               <a:rPr lang="en-GB" dirty="0"/>
               <a:t>JOA509 – Frontiers of Fusion</a:t>
             </a:r>
-            <a:endParaRPr lang="en-GB" dirty="0"/>
           </a:p>
         </p:txBody>
       </p:sp>
@@ -2111,7 +2934,12 @@
             <p:ph type="sldNum" sz="quarter" idx="12"/>
           </p:nvPr>
         </p:nvSpPr>
-        <p:spPr/>
+        <p:spPr>
+          <a:xfrm>
+            <a:off x="4724400" y="6266197"/>
+            <a:ext cx="2743200" cy="365125"/>
+          </a:xfrm>
+        </p:spPr>
         <p:txBody>
           <a:bodyPr/>
           <a:lstStyle/>
@@ -2120,7 +2948,7 @@
               <a:rPr lang="en-GB" smtClean="0"/>
               <a:t>2</a:t>
             </a:fld>
-            <a:endParaRPr lang="en-GB"/>
+            <a:endParaRPr lang="en-GB" dirty="0"/>
           </a:p>
         </p:txBody>
       </p:sp>
@@ -2196,7 +3024,7 @@
         </p:nvSpPr>
         <p:spPr>
           <a:xfrm>
-            <a:off x="190500" y="0"/>
+            <a:off x="137492" y="0"/>
             <a:ext cx="12001500" cy="1325563"/>
           </a:xfrm>
         </p:spPr>
@@ -2208,11 +3036,7 @@
           <a:p>
             <a:r>
               <a:rPr lang="en-GB" sz="6000" dirty="0" smtClean="0"/>
-              <a:t>1. </a:t>
-            </a:r>
-            <a:r>
-              <a:rPr lang="en-GB" sz="6000" dirty="0" smtClean="0"/>
-              <a:t>Background understanding of ELMs</a:t>
+              <a:t>1. Background understanding of ELMs</a:t>
             </a:r>
             <a:endParaRPr lang="en-GB" sz="6000" dirty="0"/>
           </a:p>
@@ -2264,7 +3088,11 @@
             </a:pPr>
             <a:r>
               <a:rPr lang="en-GB" dirty="0" smtClean="0"/>
-              <a:t>Edge pedestal gradient is inherently unstable</a:t>
+              <a:t>Edge pedestal gradient is inherently </a:t>
+            </a:r>
+            <a:r>
+              <a:rPr lang="en-GB" dirty="0" smtClean="0"/>
+              <a:t>unstable</a:t>
             </a:r>
           </a:p>
           <a:p>
@@ -2283,38 +3111,20 @@
             </a:pPr>
             <a:r>
               <a:rPr lang="en-GB" dirty="0" smtClean="0"/>
-              <a:t>Several different types</a:t>
-            </a:r>
-          </a:p>
-          <a:p>
-            <a:pPr lvl="1">
-              <a:buSzPct val="120000"/>
-              <a:buFont typeface="Wingdings" panose="05000000000000000000" pitchFamily="2" charset="2"/>
-              <a:buChar char="Ø"/>
-            </a:pPr>
+              <a:t>Thought to be caused by Peeling-Ballooning mode instabilities </a:t>
+            </a:r>
+            <a:endParaRPr lang="en-GB" dirty="0" smtClean="0"/>
+          </a:p>
+          <a:p>
+            <a:pPr lvl="1"/>
             <a:r>
               <a:rPr lang="en-GB" dirty="0" smtClean="0"/>
-              <a:t>Focussing on type I ELMs here</a:t>
-            </a:r>
-          </a:p>
-          <a:p>
-            <a:pPr lvl="1">
-              <a:buSzPct val="120000"/>
-              <a:buFont typeface="Wingdings" panose="05000000000000000000" pitchFamily="2" charset="2"/>
-              <a:buChar char="Ø"/>
-            </a:pPr>
+              <a:t>ELM causes crash, cycle repeats</a:t>
+            </a:r>
             <a:endParaRPr lang="en-GB" dirty="0" smtClean="0"/>
           </a:p>
           <a:p>
-            <a:pPr>
-              <a:buSzPct val="120000"/>
-              <a:buFont typeface="Wingdings" panose="05000000000000000000" pitchFamily="2" charset="2"/>
-              <a:buChar char="Ø"/>
-            </a:pPr>
-            <a:r>
-              <a:rPr lang="en-GB" dirty="0" smtClean="0"/>
-              <a:t>Thought to be caused by Peeling-Ballooning mode instabilities </a:t>
-            </a:r>
+            <a:pPr lvl="1"/>
             <a:endParaRPr lang="en-GB" dirty="0"/>
           </a:p>
         </p:txBody>
@@ -2349,10 +3159,15 @@
             <a:spLocks noGrp="1"/>
           </p:cNvSpPr>
           <p:nvPr>
-            <p:ph type="ftr" sz="quarter" idx="11"/>
-          </p:nvPr>
-        </p:nvSpPr>
-        <p:spPr/>
+            <p:ph type="ftr" sz="quarter" idx="3"/>
+          </p:nvPr>
+        </p:nvSpPr>
+        <p:spPr>
+          <a:xfrm>
+            <a:off x="7912100" y="6343650"/>
+            <a:ext cx="4114800" cy="365125"/>
+          </a:xfrm>
+        </p:spPr>
         <p:txBody>
           <a:bodyPr/>
           <a:lstStyle/>
@@ -2375,7 +3190,12 @@
             <p:ph type="sldNum" sz="quarter" idx="12"/>
           </p:nvPr>
         </p:nvSpPr>
-        <p:spPr/>
+        <p:spPr>
+          <a:xfrm>
+            <a:off x="4724400" y="6356350"/>
+            <a:ext cx="2743200" cy="365125"/>
+          </a:xfrm>
+        </p:spPr>
         <p:txBody>
           <a:bodyPr/>
           <a:lstStyle/>
@@ -2384,7 +3204,7 @@
               <a:rPr lang="en-GB" smtClean="0"/>
               <a:t>3</a:t>
             </a:fld>
-            <a:endParaRPr lang="en-GB"/>
+            <a:endParaRPr lang="en-GB" dirty="0"/>
           </a:p>
         </p:txBody>
       </p:sp>
@@ -2504,6 +3324,40 @@
           </p:txBody>
         </p:sp>
       </p:grpSp>
+      <p:sp>
+        <p:nvSpPr>
+          <p:cNvPr id="10" name="TextBox 9"/>
+          <p:cNvSpPr txBox="1"/>
+          <p:nvPr/>
+        </p:nvSpPr>
+        <p:spPr>
+          <a:xfrm>
+            <a:off x="8483047" y="1205948"/>
+            <a:ext cx="2900569" cy="523220"/>
+          </a:xfrm>
+          <a:prstGeom prst="rect">
+            <a:avLst/>
+          </a:prstGeom>
+          <a:noFill/>
+        </p:spPr>
+        <p:txBody>
+          <a:bodyPr wrap="square" rtlCol="0">
+            <a:spAutoFit/>
+          </a:bodyPr>
+          <a:lstStyle/>
+          <a:p>
+            <a:r>
+              <a:rPr lang="en-GB" sz="2800" dirty="0" smtClean="0">
+                <a:latin typeface="Baskerville Old Face" panose="02020602080505020303" pitchFamily="18" charset="0"/>
+              </a:rPr>
+              <a:t>Type-I ELM cycles</a:t>
+            </a:r>
+            <a:endParaRPr lang="en-GB" sz="2800" dirty="0">
+              <a:latin typeface="Baskerville Old Face" panose="02020602080505020303" pitchFamily="18" charset="0"/>
+            </a:endParaRPr>
+          </a:p>
+        </p:txBody>
+      </p:sp>
     </p:spTree>
     <p:extLst>
       <p:ext uri="{BB962C8B-B14F-4D97-AF65-F5344CB8AC3E}">
@@ -2633,7 +3487,7 @@
                             </p:stCondLst>
                             <p:childTnLst>
                               <p:par>
-                                <p:cTn id="13" presetID="1" presetClass="entr" presetSubtype="0" fill="hold" nodeType="clickEffect">
+                                <p:cTn id="13" presetID="1" presetClass="entr" presetSubtype="0" fill="hold" grpId="0" nodeType="clickEffect">
                                   <p:stCondLst>
                                     <p:cond delay="0"/>
                                   </p:stCondLst>
@@ -2664,7 +3518,7 @@
                                 </p:cTn>
                               </p:par>
                               <p:par>
-                                <p:cTn id="15" presetID="1" presetClass="entr" presetSubtype="0" fill="hold" nodeType="withEffect">
+                                <p:cTn id="15" presetID="1" presetClass="entr" presetSubtype="0" fill="hold" grpId="0" nodeType="withEffect">
                                   <p:stCondLst>
                                     <p:cond delay="0"/>
                                   </p:stCondLst>
@@ -2694,64 +3548,15 @@
                                   </p:childTnLst>
                                 </p:cTn>
                               </p:par>
-                            </p:childTnLst>
-                          </p:cTn>
-                        </p:par>
-                      </p:childTnLst>
-                    </p:cTn>
-                  </p:par>
-                  <p:par>
-                    <p:cTn id="17" fill="hold">
-                      <p:stCondLst>
-                        <p:cond delay="indefinite"/>
-                      </p:stCondLst>
-                      <p:childTnLst>
-                        <p:par>
-                          <p:cTn id="18" fill="hold">
-                            <p:stCondLst>
-                              <p:cond delay="0"/>
-                            </p:stCondLst>
-                            <p:childTnLst>
                               <p:par>
-                                <p:cTn id="19" presetID="1" presetClass="entr" presetSubtype="0" fill="hold" grpId="0" nodeType="clickEffect">
+                                <p:cTn id="17" presetID="1" presetClass="entr" presetSubtype="0" fill="hold" nodeType="withEffect">
                                   <p:stCondLst>
                                     <p:cond delay="0"/>
                                   </p:stCondLst>
                                   <p:childTnLst>
                                     <p:set>
                                       <p:cBhvr>
-                                        <p:cTn id="20" dur="1" fill="hold">
-                                          <p:stCondLst>
-                                            <p:cond delay="0"/>
-                                          </p:stCondLst>
-                                        </p:cTn>
-                                        <p:tgtEl>
-                                          <p:spTgt spid="3">
-                                            <p:txEl>
-                                              <p:pRg st="7" end="7"/>
-                                            </p:txEl>
-                                          </p:spTgt>
-                                        </p:tgtEl>
-                                        <p:attrNameLst>
-                                          <p:attrName>style.visibility</p:attrName>
-                                        </p:attrNameLst>
-                                      </p:cBhvr>
-                                      <p:to>
-                                        <p:strVal val="visible"/>
-                                      </p:to>
-                                    </p:set>
-                                  </p:childTnLst>
-                                </p:cTn>
-                              </p:par>
-                              <p:par>
-                                <p:cTn id="21" presetID="1" presetClass="entr" presetSubtype="0" fill="hold" nodeType="withEffect">
-                                  <p:stCondLst>
-                                    <p:cond delay="0"/>
-                                  </p:stCondLst>
-                                  <p:childTnLst>
-                                    <p:set>
-                                      <p:cBhvr>
-                                        <p:cTn id="22" dur="1" fill="hold">
+                                        <p:cTn id="18" dur="1" fill="hold">
                                           <p:stCondLst>
                                             <p:cond delay="0"/>
                                           </p:stCondLst>
@@ -2823,18 +3628,41 @@
       </p:grpSpPr>
       <p:sp>
         <p:nvSpPr>
-          <p:cNvPr id="2" name="Title 1"/>
-          <p:cNvSpPr>
-            <a:spLocks noGrp="1"/>
-          </p:cNvSpPr>
-          <p:nvPr>
-            <p:ph type="title"/>
+          <p:cNvPr id="4" name="Date Placeholder 3"/>
+          <p:cNvSpPr>
+            <a:spLocks noGrp="1"/>
+          </p:cNvSpPr>
+          <p:nvPr>
+            <p:ph type="dt" sz="half" idx="10"/>
+          </p:nvPr>
+        </p:nvSpPr>
+        <p:spPr/>
+        <p:txBody>
+          <a:bodyPr/>
+          <a:lstStyle/>
+          <a:p>
+            <a:r>
+              <a:rPr lang="en-GB" smtClean="0"/>
+              <a:t>31/05/2016</a:t>
+            </a:r>
+            <a:endParaRPr lang="en-GB" dirty="0"/>
+          </a:p>
+        </p:txBody>
+      </p:sp>
+      <p:sp>
+        <p:nvSpPr>
+          <p:cNvPr id="5" name="Footer Placeholder 4"/>
+          <p:cNvSpPr>
+            <a:spLocks noGrp="1"/>
+          </p:cNvSpPr>
+          <p:nvPr>
+            <p:ph type="ftr" sz="quarter" idx="3"/>
           </p:nvPr>
         </p:nvSpPr>
         <p:spPr>
           <a:xfrm>
-            <a:off x="838200" y="0"/>
-            <a:ext cx="10515600" cy="1325563"/>
+            <a:off x="7912100" y="6343650"/>
+            <a:ext cx="4114800" cy="365125"/>
           </a:xfrm>
         </p:spPr>
         <p:txBody>
@@ -2842,26 +3670,121 @@
           <a:lstStyle/>
           <a:p>
             <a:r>
-              <a:rPr lang="en-GB" sz="6000" dirty="0" smtClean="0"/>
-              <a:t>2. </a:t>
-            </a:r>
-            <a:r>
-              <a:rPr lang="en-GB" sz="6000" dirty="0" smtClean="0"/>
-              <a:t>Problems ELMs cause</a:t>
+              <a:rPr lang="en-GB" smtClean="0"/>
+              <a:t>JOA509 – Frontiers of Fusion</a:t>
             </a:r>
             <a:endParaRPr lang="en-GB" dirty="0"/>
+          </a:p>
+        </p:txBody>
+      </p:sp>
+      <p:sp>
+        <p:nvSpPr>
+          <p:cNvPr id="6" name="Slide Number Placeholder 5"/>
+          <p:cNvSpPr>
+            <a:spLocks noGrp="1"/>
+          </p:cNvSpPr>
+          <p:nvPr>
+            <p:ph type="sldNum" sz="quarter" idx="12"/>
+          </p:nvPr>
+        </p:nvSpPr>
+        <p:spPr>
+          <a:xfrm>
+            <a:off x="8610600" y="6356350"/>
+            <a:ext cx="2743200" cy="365125"/>
+          </a:xfrm>
+        </p:spPr>
+        <p:txBody>
+          <a:bodyPr/>
+          <a:lstStyle/>
+          <a:p>
+            <a:fld id="{581BB28B-6C27-444C-B2E2-3960C28AE47A}" type="slidenum">
+              <a:rPr lang="en-GB" smtClean="0"/>
+              <a:t>4</a:t>
+            </a:fld>
+            <a:endParaRPr lang="en-GB"/>
+          </a:p>
+        </p:txBody>
+      </p:sp>
+      <p:sp>
+        <p:nvSpPr>
+          <p:cNvPr id="8" name="Content Placeholder 7"/>
+          <p:cNvSpPr>
+            <a:spLocks noGrp="1"/>
+          </p:cNvSpPr>
+          <p:nvPr>
+            <p:ph idx="1"/>
+          </p:nvPr>
+        </p:nvSpPr>
+        <p:spPr>
+          <a:xfrm>
+            <a:off x="400050" y="3641552"/>
+            <a:ext cx="11391900" cy="2003873"/>
+          </a:xfrm>
+        </p:spPr>
+        <p:txBody>
+          <a:bodyPr>
+            <a:noAutofit/>
+          </a:bodyPr>
+          <a:lstStyle/>
+          <a:p>
+            <a:r>
+              <a:rPr lang="en-GB" sz="3000" dirty="0" smtClean="0"/>
+              <a:t> Several </a:t>
+            </a:r>
+            <a:r>
+              <a:rPr lang="en-GB" sz="3000" dirty="0" smtClean="0"/>
+              <a:t>tokamaks have corroborated this scaling for ELM frequency, </a:t>
+            </a:r>
+            <a:r>
+              <a:rPr lang="en-GB" sz="3000" b="1" dirty="0" err="1" smtClean="0"/>
+              <a:t>f</a:t>
+            </a:r>
+            <a:r>
+              <a:rPr lang="en-GB" sz="3000" b="1" baseline="-25000" dirty="0" err="1" smtClean="0"/>
+              <a:t>ELM</a:t>
+            </a:r>
+            <a:r>
+              <a:rPr lang="en-GB" sz="3000" dirty="0" smtClean="0"/>
+              <a:t> </a:t>
+            </a:r>
+            <a:endParaRPr lang="en-GB" sz="3000" dirty="0"/>
+          </a:p>
+          <a:p>
+            <a:pPr lvl="1"/>
+            <a:endParaRPr lang="en-GB" sz="2600" dirty="0" smtClean="0"/>
+          </a:p>
+          <a:p>
+            <a:r>
+              <a:rPr lang="en-GB" sz="3000" b="1" dirty="0" smtClean="0"/>
+              <a:t> ∆</a:t>
+            </a:r>
+            <a:r>
+              <a:rPr lang="en-GB" sz="3000" b="1" dirty="0" smtClean="0"/>
+              <a:t>W</a:t>
+            </a:r>
+            <a:r>
+              <a:rPr lang="en-GB" sz="3000" b="1" baseline="-25000" dirty="0" smtClean="0"/>
+              <a:t>ELM</a:t>
+            </a:r>
+            <a:r>
+              <a:rPr lang="en-GB" sz="3000" b="1" dirty="0" smtClean="0"/>
+              <a:t> </a:t>
+            </a:r>
+            <a:r>
+              <a:rPr lang="en-GB" sz="3000" dirty="0" smtClean="0"/>
+              <a:t>is the ELM energy</a:t>
+            </a:r>
+            <a:endParaRPr lang="en-GB" sz="3000" b="1" dirty="0" smtClean="0"/>
           </a:p>
         </p:txBody>
       </p:sp>
       <p:pic>
         <p:nvPicPr>
-          <p:cNvPr id="7" name="Content Placeholder 6"/>
+          <p:cNvPr id="9" name="Content Placeholder 6"/>
           <p:cNvPicPr>
-            <a:picLocks noGrp="1" noChangeAspect="1"/>
+            <a:picLocks noChangeAspect="1"/>
           </p:cNvPicPr>
-          <p:nvPr>
-            <p:ph idx="1"/>
-          </p:nvPr>
+          <p:nvPr/>
         </p:nvPicPr>
         <p:blipFill>
           <a:blip r:embed="rId2">
@@ -2877,6 +3800,183 @@
         </p:blipFill>
         <p:spPr>
           <a:xfrm>
+            <a:off x="838200" y="1632335"/>
+            <a:ext cx="10515600" cy="1174330"/>
+          </a:xfrm>
+          <a:prstGeom prst="rect">
+            <a:avLst/>
+          </a:prstGeom>
+        </p:spPr>
+      </p:pic>
+      <p:sp>
+        <p:nvSpPr>
+          <p:cNvPr id="10" name="TextBox 9"/>
+          <p:cNvSpPr txBox="1"/>
+          <p:nvPr/>
+        </p:nvSpPr>
+        <p:spPr>
+          <a:xfrm>
+            <a:off x="5524500" y="2806665"/>
+            <a:ext cx="5829300" cy="338554"/>
+          </a:xfrm>
+          <a:prstGeom prst="rect">
+            <a:avLst/>
+          </a:prstGeom>
+          <a:noFill/>
+        </p:spPr>
+        <p:txBody>
+          <a:bodyPr wrap="square" rtlCol="0">
+            <a:spAutoFit/>
+          </a:bodyPr>
+          <a:lstStyle/>
+          <a:p>
+            <a:r>
+              <a:rPr lang="en-GB" sz="1600" dirty="0" smtClean="0">
+                <a:latin typeface="Batang" panose="02030600000101010101" pitchFamily="18" charset="-127"/>
+                <a:ea typeface="Batang" panose="02030600000101010101" pitchFamily="18" charset="-127"/>
+              </a:rPr>
+              <a:t>A. Leonard Journal of Nuclear Materials </a:t>
+            </a:r>
+            <a:r>
+              <a:rPr lang="en-GB" sz="1600" b="1" dirty="0" smtClean="0">
+                <a:latin typeface="Batang" panose="02030600000101010101" pitchFamily="18" charset="-127"/>
+                <a:ea typeface="Batang" panose="02030600000101010101" pitchFamily="18" charset="-127"/>
+              </a:rPr>
+              <a:t>266</a:t>
+            </a:r>
+            <a:r>
+              <a:rPr lang="en-GB" sz="1600" dirty="0" smtClean="0">
+                <a:latin typeface="Batang" panose="02030600000101010101" pitchFamily="18" charset="-127"/>
+                <a:ea typeface="Batang" panose="02030600000101010101" pitchFamily="18" charset="-127"/>
+              </a:rPr>
+              <a:t> 1999</a:t>
+            </a:r>
+            <a:endParaRPr lang="en-GB" sz="1600" dirty="0">
+              <a:latin typeface="Batang" panose="02030600000101010101" pitchFamily="18" charset="-127"/>
+              <a:ea typeface="Batang" panose="02030600000101010101" pitchFamily="18" charset="-127"/>
+            </a:endParaRPr>
+          </a:p>
+        </p:txBody>
+      </p:sp>
+      <p:sp>
+        <p:nvSpPr>
+          <p:cNvPr id="11" name="Title 1"/>
+          <p:cNvSpPr>
+            <a:spLocks noGrp="1"/>
+          </p:cNvSpPr>
+          <p:nvPr>
+            <p:ph type="title"/>
+          </p:nvPr>
+        </p:nvSpPr>
+        <p:spPr>
+          <a:xfrm>
+            <a:off x="137492" y="0"/>
+            <a:ext cx="12001500" cy="1325563"/>
+          </a:xfrm>
+        </p:spPr>
+        <p:txBody>
+          <a:bodyPr>
+            <a:noAutofit/>
+          </a:bodyPr>
+          <a:lstStyle/>
+          <a:p>
+            <a:r>
+              <a:rPr lang="en-GB" sz="6000" dirty="0" smtClean="0"/>
+              <a:t>1. Background understanding of ELMs</a:t>
+            </a:r>
+            <a:endParaRPr lang="en-GB" sz="6000" dirty="0"/>
+          </a:p>
+        </p:txBody>
+      </p:sp>
+    </p:spTree>
+    <p:extLst>
+      <p:ext uri="{BB962C8B-B14F-4D97-AF65-F5344CB8AC3E}">
+        <p14:creationId xmlns:p14="http://schemas.microsoft.com/office/powerpoint/2010/main" val="1217640621"/>
+      </p:ext>
+    </p:extLst>
+  </p:cSld>
+  <p:clrMapOvr>
+    <a:masterClrMapping/>
+  </p:clrMapOvr>
+  <p:timing>
+    <p:tnLst>
+      <p:par>
+        <p:cTn id="1" dur="indefinite" restart="never" nodeType="tmRoot"/>
+      </p:par>
+    </p:tnLst>
+  </p:timing>
+</p:sld>
+</file>
+
+<file path=ppt/slides/slide5.xml><?xml version="1.0" encoding="utf-8"?>
+<p:sld xmlns:a="http://schemas.openxmlformats.org/drawingml/2006/main" xmlns:r="http://schemas.openxmlformats.org/officeDocument/2006/relationships" xmlns:p="http://schemas.openxmlformats.org/presentationml/2006/main">
+  <p:cSld>
+    <p:spTree>
+      <p:nvGrpSpPr>
+        <p:cNvPr id="1" name=""/>
+        <p:cNvGrpSpPr/>
+        <p:nvPr/>
+      </p:nvGrpSpPr>
+      <p:grpSpPr>
+        <a:xfrm>
+          <a:off x="0" y="0"/>
+          <a:ext cx="0" cy="0"/>
+          <a:chOff x="0" y="0"/>
+          <a:chExt cx="0" cy="0"/>
+        </a:xfrm>
+      </p:grpSpPr>
+      <p:sp>
+        <p:nvSpPr>
+          <p:cNvPr id="2" name="Title 1"/>
+          <p:cNvSpPr>
+            <a:spLocks noGrp="1"/>
+          </p:cNvSpPr>
+          <p:nvPr>
+            <p:ph type="title"/>
+          </p:nvPr>
+        </p:nvSpPr>
+        <p:spPr>
+          <a:xfrm>
+            <a:off x="838200" y="0"/>
+            <a:ext cx="10515600" cy="1325563"/>
+          </a:xfrm>
+        </p:spPr>
+        <p:txBody>
+          <a:bodyPr/>
+          <a:lstStyle/>
+          <a:p>
+            <a:r>
+              <a:rPr lang="en-GB" sz="6000" dirty="0" smtClean="0"/>
+              <a:t>2. Problems ELMs cause</a:t>
+            </a:r>
+            <a:endParaRPr lang="en-GB" dirty="0"/>
+          </a:p>
+        </p:txBody>
+      </p:sp>
+      <p:pic>
+        <p:nvPicPr>
+          <p:cNvPr id="7" name="Content Placeholder 6"/>
+          <p:cNvPicPr>
+            <a:picLocks noGrp="1" noChangeAspect="1"/>
+          </p:cNvPicPr>
+          <p:nvPr>
+            <p:ph idx="1"/>
+          </p:nvPr>
+        </p:nvPicPr>
+        <p:blipFill>
+          <a:blip r:embed="rId2">
+            <a:extLst>
+              <a:ext uri="{28A0092B-C50C-407E-A947-70E740481C1C}">
+                <a14:useLocalDpi xmlns:a14="http://schemas.microsoft.com/office/drawing/2010/main" val="0"/>
+              </a:ext>
+            </a:extLst>
+          </a:blip>
+          <a:stretch>
+            <a:fillRect/>
+          </a:stretch>
+        </p:blipFill>
+        <p:spPr>
+          <a:xfrm>
             <a:off x="2032041" y="1047749"/>
             <a:ext cx="8127918" cy="5491163"/>
           </a:xfrm>
@@ -2912,10 +4012,15 @@
             <a:spLocks noGrp="1"/>
           </p:cNvSpPr>
           <p:nvPr>
-            <p:ph type="ftr" sz="quarter" idx="11"/>
-          </p:nvPr>
-        </p:nvSpPr>
-        <p:spPr/>
+            <p:ph type="ftr" sz="quarter" idx="3"/>
+          </p:nvPr>
+        </p:nvSpPr>
+        <p:spPr>
+          <a:xfrm>
+            <a:off x="7912100" y="6343650"/>
+            <a:ext cx="4114800" cy="365125"/>
+          </a:xfrm>
+        </p:spPr>
         <p:txBody>
           <a:bodyPr/>
           <a:lstStyle/>
@@ -2938,14 +4043,19 @@
             <p:ph type="sldNum" sz="quarter" idx="12"/>
           </p:nvPr>
         </p:nvSpPr>
-        <p:spPr/>
+        <p:spPr>
+          <a:xfrm>
+            <a:off x="8610600" y="6356350"/>
+            <a:ext cx="2743200" cy="365125"/>
+          </a:xfrm>
+        </p:spPr>
         <p:txBody>
           <a:bodyPr/>
           <a:lstStyle/>
           <a:p>
             <a:fld id="{581BB28B-6C27-444C-B2E2-3960C28AE47A}" type="slidenum">
               <a:rPr lang="en-GB" smtClean="0"/>
-              <a:t>4</a:t>
+              <a:t>5</a:t>
             </a:fld>
             <a:endParaRPr lang="en-GB"/>
           </a:p>
@@ -2959,10 +4069,10 @@
         </p:nvSpPr>
         <p:spPr>
           <a:xfrm>
-            <a:off x="2209800" y="2076450"/>
-            <a:ext cx="6400800" cy="2677656"/>
-          </a:xfrm>
-          <a:prstGeom prst="rect">
+            <a:off x="2209799" y="1844628"/>
+            <a:ext cx="7100015" cy="4392692"/>
+          </a:xfrm>
+          <a:prstGeom prst="roundRect">
             <a:avLst/>
           </a:prstGeom>
           <a:solidFill>
@@ -3045,14 +4155,228 @@
               <a:rPr lang="en-GB" sz="2800" dirty="0" smtClean="0">
                 <a:latin typeface="Baskerville Old Face" panose="02020602080505020303" pitchFamily="18" charset="0"/>
               </a:rPr>
-              <a:t>May destabilise core plasma modes</a:t>
-            </a:r>
+              <a:t>May destabilise core plasma </a:t>
+            </a:r>
+            <a:r>
+              <a:rPr lang="en-GB" sz="2800" dirty="0" smtClean="0">
+                <a:latin typeface="Baskerville Old Face" panose="02020602080505020303" pitchFamily="18" charset="0"/>
+              </a:rPr>
+              <a:t>modes</a:t>
+            </a:r>
+          </a:p>
+          <a:p>
+            <a:pPr marL="457200" indent="-457200">
+              <a:buSzPct val="120000"/>
+              <a:buFont typeface="Wingdings" panose="05000000000000000000" pitchFamily="2" charset="2"/>
+              <a:buChar char="Ø"/>
+            </a:pPr>
             <a:endParaRPr lang="en-GB" sz="2800" dirty="0">
               <a:latin typeface="Baskerville Old Face" panose="02020602080505020303" pitchFamily="18" charset="0"/>
             </a:endParaRPr>
           </a:p>
-        </p:txBody>
-      </p:sp>
+          <a:p>
+            <a:pPr marL="457200" indent="-457200">
+              <a:buSzPct val="120000"/>
+              <a:buFont typeface="Wingdings" panose="05000000000000000000" pitchFamily="2" charset="2"/>
+              <a:buChar char="Ø"/>
+            </a:pPr>
+            <a:r>
+              <a:rPr lang="en-GB" sz="2800" dirty="0" smtClean="0">
+                <a:latin typeface="Baskerville Old Face" panose="02020602080505020303" pitchFamily="18" charset="0"/>
+              </a:rPr>
+              <a:t>However they reduce plasma impurity levels </a:t>
+            </a:r>
+            <a:endParaRPr lang="en-GB" sz="2800" dirty="0">
+              <a:latin typeface="Baskerville Old Face" panose="02020602080505020303" pitchFamily="18" charset="0"/>
+            </a:endParaRPr>
+          </a:p>
+        </p:txBody>
+      </p:sp>
+      <p:sp>
+        <p:nvSpPr>
+          <p:cNvPr id="3" name="Multiply 2"/>
+          <p:cNvSpPr/>
+          <p:nvPr/>
+        </p:nvSpPr>
+        <p:spPr>
+          <a:xfrm>
+            <a:off x="6117463" y="1854561"/>
+            <a:ext cx="1133341" cy="1159096"/>
+          </a:xfrm>
+          <a:prstGeom prst="mathMultiply">
+            <a:avLst/>
+          </a:prstGeom>
+          <a:solidFill>
+            <a:srgbClr val="FF0000"/>
+          </a:solidFill>
+          <a:ln>
+            <a:solidFill>
+              <a:srgbClr val="FF0000"/>
+            </a:solidFill>
+          </a:ln>
+        </p:spPr>
+        <p:style>
+          <a:lnRef idx="2">
+            <a:schemeClr val="accent1">
+              <a:shade val="50000"/>
+            </a:schemeClr>
+          </a:lnRef>
+          <a:fillRef idx="1">
+            <a:schemeClr val="accent1"/>
+          </a:fillRef>
+          <a:effectRef idx="0">
+            <a:schemeClr val="accent1"/>
+          </a:effectRef>
+          <a:fontRef idx="minor">
+            <a:schemeClr val="lt1"/>
+          </a:fontRef>
+        </p:style>
+        <p:txBody>
+          <a:bodyPr rtlCol="0" anchor="ctr"/>
+          <a:lstStyle/>
+          <a:p>
+            <a:pPr algn="ctr"/>
+            <a:endParaRPr lang="en-GB"/>
+          </a:p>
+        </p:txBody>
+      </p:sp>
+      <p:sp>
+        <p:nvSpPr>
+          <p:cNvPr id="9" name="Multiply 8"/>
+          <p:cNvSpPr/>
+          <p:nvPr/>
+        </p:nvSpPr>
+        <p:spPr>
+          <a:xfrm>
+            <a:off x="8639577" y="2845696"/>
+            <a:ext cx="1045336" cy="1026783"/>
+          </a:xfrm>
+          <a:prstGeom prst="mathMultiply">
+            <a:avLst/>
+          </a:prstGeom>
+          <a:solidFill>
+            <a:srgbClr val="FF0000"/>
+          </a:solidFill>
+          <a:ln>
+            <a:solidFill>
+              <a:srgbClr val="FF0000"/>
+            </a:solidFill>
+          </a:ln>
+        </p:spPr>
+        <p:style>
+          <a:lnRef idx="2">
+            <a:schemeClr val="accent1">
+              <a:shade val="50000"/>
+            </a:schemeClr>
+          </a:lnRef>
+          <a:fillRef idx="1">
+            <a:schemeClr val="accent1"/>
+          </a:fillRef>
+          <a:effectRef idx="0">
+            <a:schemeClr val="accent1"/>
+          </a:effectRef>
+          <a:fontRef idx="minor">
+            <a:schemeClr val="lt1"/>
+          </a:fontRef>
+        </p:style>
+        <p:txBody>
+          <a:bodyPr rtlCol="0" anchor="ctr"/>
+          <a:lstStyle/>
+          <a:p>
+            <a:pPr algn="ctr"/>
+            <a:endParaRPr lang="en-GB"/>
+          </a:p>
+        </p:txBody>
+      </p:sp>
+      <p:sp>
+        <p:nvSpPr>
+          <p:cNvPr id="10" name="Multiply 9"/>
+          <p:cNvSpPr/>
+          <p:nvPr/>
+        </p:nvSpPr>
+        <p:spPr>
+          <a:xfrm>
+            <a:off x="8168959" y="3888692"/>
+            <a:ext cx="1140855" cy="1075156"/>
+          </a:xfrm>
+          <a:prstGeom prst="mathMultiply">
+            <a:avLst/>
+          </a:prstGeom>
+          <a:solidFill>
+            <a:srgbClr val="FF0000"/>
+          </a:solidFill>
+          <a:ln>
+            <a:solidFill>
+              <a:srgbClr val="FF0000"/>
+            </a:solidFill>
+          </a:ln>
+        </p:spPr>
+        <p:style>
+          <a:lnRef idx="2">
+            <a:schemeClr val="accent1">
+              <a:shade val="50000"/>
+            </a:schemeClr>
+          </a:lnRef>
+          <a:fillRef idx="1">
+            <a:schemeClr val="accent1"/>
+          </a:fillRef>
+          <a:effectRef idx="0">
+            <a:schemeClr val="accent1"/>
+          </a:effectRef>
+          <a:fontRef idx="minor">
+            <a:schemeClr val="lt1"/>
+          </a:fontRef>
+        </p:style>
+        <p:txBody>
+          <a:bodyPr rtlCol="0" anchor="ctr"/>
+          <a:lstStyle/>
+          <a:p>
+            <a:pPr algn="ctr"/>
+            <a:endParaRPr lang="en-GB"/>
+          </a:p>
+        </p:txBody>
+      </p:sp>
+      <p:pic>
+        <p:nvPicPr>
+          <p:cNvPr id="4098" name="Picture 2" descr="https://upload.wikimedia.org/wikipedia/commons/thumb/e/e5/Green_tick_pointed.svg/1024px-Green_tick_pointed.svg.png"/>
+          <p:cNvPicPr>
+            <a:picLocks noChangeAspect="1" noChangeArrowheads="1"/>
+          </p:cNvPicPr>
+          <p:nvPr/>
+        </p:nvPicPr>
+        <p:blipFill>
+          <a:blip r:embed="rId3" cstate="print">
+            <a:extLst>
+              <a:ext uri="{28A0092B-C50C-407E-A947-70E740481C1C}">
+                <a14:useLocalDpi xmlns:a14="http://schemas.microsoft.com/office/drawing/2010/main" val="0"/>
+              </a:ext>
+            </a:extLst>
+          </a:blip>
+          <a:srcRect/>
+          <a:stretch>
+            <a:fillRect/>
+          </a:stretch>
+        </p:blipFill>
+        <p:spPr bwMode="auto">
+          <a:xfrm>
+            <a:off x="8062172" y="5178916"/>
+            <a:ext cx="1105974" cy="1105974"/>
+          </a:xfrm>
+          <a:prstGeom prst="rect">
+            <a:avLst/>
+          </a:prstGeom>
+          <a:noFill/>
+          <a:extLst>
+            <a:ext uri="{909E8E84-426E-40DD-AFC4-6F175D3DCCD1}">
+              <a14:hiddenFill xmlns:a14="http://schemas.microsoft.com/office/drawing/2010/main">
+                <a:solidFill>
+                  <a:srgbClr val="FFFFFF"/>
+                </a:solidFill>
+              </a14:hiddenFill>
+            </a:ext>
+          </a:extLst>
+        </p:spPr>
+      </p:pic>
     </p:spTree>
     <p:extLst>
       <p:ext uri="{BB962C8B-B14F-4D97-AF65-F5344CB8AC3E}">
@@ -3164,30 +4488,74 @@
                             </p:childTnLst>
                           </p:cTn>
                         </p:par>
-                      </p:childTnLst>
-                    </p:cTn>
-                  </p:par>
-                  <p:par>
-                    <p:cTn id="11" fill="hold">
-                      <p:stCondLst>
-                        <p:cond delay="indefinite"/>
-                      </p:stCondLst>
-                      <p:childTnLst>
                         <p:par>
-                          <p:cTn id="12" fill="hold">
+                          <p:cTn id="11" fill="hold">
                             <p:stCondLst>
                               <p:cond delay="0"/>
                             </p:stCondLst>
                             <p:childTnLst>
                               <p:par>
-                                <p:cTn id="13" presetID="1" presetClass="entr" presetSubtype="0" fill="hold" grpId="0" nodeType="clickEffect">
+                                <p:cTn id="12" presetID="10" presetClass="entr" presetSubtype="0" fill="hold" grpId="0" nodeType="afterEffect">
                                   <p:stCondLst>
                                     <p:cond delay="0"/>
                                   </p:stCondLst>
                                   <p:childTnLst>
                                     <p:set>
                                       <p:cBhvr>
-                                        <p:cTn id="14" dur="1" fill="hold">
+                                        <p:cTn id="13" dur="1" fill="hold">
+                                          <p:stCondLst>
+                                            <p:cond delay="0"/>
+                                          </p:stCondLst>
+                                        </p:cTn>
+                                        <p:tgtEl>
+                                          <p:spTgt spid="3"/>
+                                        </p:tgtEl>
+                                        <p:attrNameLst>
+                                          <p:attrName>style.visibility</p:attrName>
+                                        </p:attrNameLst>
+                                      </p:cBhvr>
+                                      <p:to>
+                                        <p:strVal val="visible"/>
+                                      </p:to>
+                                    </p:set>
+                                    <p:animEffect transition="in" filter="fade">
+                                      <p:cBhvr>
+                                        <p:cTn id="14" dur="500"/>
+                                        <p:tgtEl>
+                                          <p:spTgt spid="3"/>
+                                        </p:tgtEl>
+                                      </p:cBhvr>
+                                    </p:animEffect>
+                                  </p:childTnLst>
+                                </p:cTn>
+                              </p:par>
+                            </p:childTnLst>
+                          </p:cTn>
+                        </p:par>
+                      </p:childTnLst>
+                    </p:cTn>
+                  </p:par>
+                  <p:par>
+                    <p:cTn id="15" fill="hold">
+                      <p:stCondLst>
+                        <p:cond delay="indefinite"/>
+                      </p:stCondLst>
+                      <p:childTnLst>
+                        <p:par>
+                          <p:cTn id="16" fill="hold">
+                            <p:stCondLst>
+                              <p:cond delay="0"/>
+                            </p:stCondLst>
+                            <p:childTnLst>
+                              <p:par>
+                                <p:cTn id="17" presetID="1" presetClass="entr" presetSubtype="0" fill="hold" grpId="0" nodeType="clickEffect">
+                                  <p:stCondLst>
+                                    <p:cond delay="0"/>
+                                  </p:stCondLst>
+                                  <p:childTnLst>
+                                    <p:set>
+                                      <p:cBhvr>
+                                        <p:cTn id="18" dur="1" fill="hold">
                                           <p:stCondLst>
                                             <p:cond delay="0"/>
                                           </p:stCondLst>
@@ -3211,14 +4579,14 @@
                                 </p:cTn>
                               </p:par>
                               <p:par>
-                                <p:cTn id="15" presetID="1" presetClass="entr" presetSubtype="0" fill="hold" grpId="0" nodeType="withEffect">
+                                <p:cTn id="19" presetID="1" presetClass="entr" presetSubtype="0" fill="hold" grpId="0" nodeType="withEffect">
                                   <p:stCondLst>
                                     <p:cond delay="0"/>
                                   </p:stCondLst>
                                   <p:childTnLst>
                                     <p:set>
                                       <p:cBhvr>
-                                        <p:cTn id="16" dur="1" fill="hold">
+                                        <p:cTn id="20" dur="1" fill="hold">
                                           <p:stCondLst>
                                             <p:cond delay="0"/>
                                           </p:stCondLst>
@@ -3244,30 +4612,74 @@
                             </p:childTnLst>
                           </p:cTn>
                         </p:par>
-                      </p:childTnLst>
-                    </p:cTn>
-                  </p:par>
-                  <p:par>
-                    <p:cTn id="17" fill="hold">
-                      <p:stCondLst>
-                        <p:cond delay="indefinite"/>
-                      </p:stCondLst>
-                      <p:childTnLst>
                         <p:par>
-                          <p:cTn id="18" fill="hold">
+                          <p:cTn id="21" fill="hold">
                             <p:stCondLst>
                               <p:cond delay="0"/>
                             </p:stCondLst>
                             <p:childTnLst>
                               <p:par>
-                                <p:cTn id="19" presetID="1" presetClass="entr" presetSubtype="0" fill="hold" grpId="0" nodeType="clickEffect">
+                                <p:cTn id="22" presetID="10" presetClass="entr" presetSubtype="0" fill="hold" grpId="0" nodeType="afterEffect">
                                   <p:stCondLst>
                                     <p:cond delay="0"/>
                                   </p:stCondLst>
                                   <p:childTnLst>
                                     <p:set>
                                       <p:cBhvr>
-                                        <p:cTn id="20" dur="1" fill="hold">
+                                        <p:cTn id="23" dur="1" fill="hold">
+                                          <p:stCondLst>
+                                            <p:cond delay="0"/>
+                                          </p:stCondLst>
+                                        </p:cTn>
+                                        <p:tgtEl>
+                                          <p:spTgt spid="9"/>
+                                        </p:tgtEl>
+                                        <p:attrNameLst>
+                                          <p:attrName>style.visibility</p:attrName>
+                                        </p:attrNameLst>
+                                      </p:cBhvr>
+                                      <p:to>
+                                        <p:strVal val="visible"/>
+                                      </p:to>
+                                    </p:set>
+                                    <p:animEffect transition="in" filter="fade">
+                                      <p:cBhvr>
+                                        <p:cTn id="24" dur="500"/>
+                                        <p:tgtEl>
+                                          <p:spTgt spid="9"/>
+                                        </p:tgtEl>
+                                      </p:cBhvr>
+                                    </p:animEffect>
+                                  </p:childTnLst>
+                                </p:cTn>
+                              </p:par>
+                            </p:childTnLst>
+                          </p:cTn>
+                        </p:par>
+                      </p:childTnLst>
+                    </p:cTn>
+                  </p:par>
+                  <p:par>
+                    <p:cTn id="25" fill="hold">
+                      <p:stCondLst>
+                        <p:cond delay="indefinite"/>
+                      </p:stCondLst>
+                      <p:childTnLst>
+                        <p:par>
+                          <p:cTn id="26" fill="hold">
+                            <p:stCondLst>
+                              <p:cond delay="0"/>
+                            </p:stCondLst>
+                            <p:childTnLst>
+                              <p:par>
+                                <p:cTn id="27" presetID="1" presetClass="entr" presetSubtype="0" fill="hold" grpId="0" nodeType="clickEffect">
+                                  <p:stCondLst>
+                                    <p:cond delay="0"/>
+                                  </p:stCondLst>
+                                  <p:childTnLst>
+                                    <p:set>
+                                      <p:cBhvr>
+                                        <p:cTn id="28" dur="1" fill="hold">
                                           <p:stCondLst>
                                             <p:cond delay="0"/>
                                           </p:stCondLst>
@@ -3287,6 +4699,143 @@
                                         <p:strVal val="visible"/>
                                       </p:to>
                                     </p:set>
+                                  </p:childTnLst>
+                                </p:cTn>
+                              </p:par>
+                            </p:childTnLst>
+                          </p:cTn>
+                        </p:par>
+                        <p:par>
+                          <p:cTn id="29" fill="hold">
+                            <p:stCondLst>
+                              <p:cond delay="0"/>
+                            </p:stCondLst>
+                            <p:childTnLst>
+                              <p:par>
+                                <p:cTn id="30" presetID="10" presetClass="entr" presetSubtype="0" fill="hold" grpId="0" nodeType="afterEffect">
+                                  <p:stCondLst>
+                                    <p:cond delay="0"/>
+                                  </p:stCondLst>
+                                  <p:childTnLst>
+                                    <p:set>
+                                      <p:cBhvr>
+                                        <p:cTn id="31" dur="1" fill="hold">
+                                          <p:stCondLst>
+                                            <p:cond delay="0"/>
+                                          </p:stCondLst>
+                                        </p:cTn>
+                                        <p:tgtEl>
+                                          <p:spTgt spid="10"/>
+                                        </p:tgtEl>
+                                        <p:attrNameLst>
+                                          <p:attrName>style.visibility</p:attrName>
+                                        </p:attrNameLst>
+                                      </p:cBhvr>
+                                      <p:to>
+                                        <p:strVal val="visible"/>
+                                      </p:to>
+                                    </p:set>
+                                    <p:animEffect transition="in" filter="fade">
+                                      <p:cBhvr>
+                                        <p:cTn id="32" dur="500"/>
+                                        <p:tgtEl>
+                                          <p:spTgt spid="10"/>
+                                        </p:tgtEl>
+                                      </p:cBhvr>
+                                    </p:animEffect>
+                                  </p:childTnLst>
+                                </p:cTn>
+                              </p:par>
+                            </p:childTnLst>
+                          </p:cTn>
+                        </p:par>
+                      </p:childTnLst>
+                    </p:cTn>
+                  </p:par>
+                  <p:par>
+                    <p:cTn id="33" fill="hold">
+                      <p:stCondLst>
+                        <p:cond delay="indefinite"/>
+                      </p:stCondLst>
+                      <p:childTnLst>
+                        <p:par>
+                          <p:cTn id="34" fill="hold">
+                            <p:stCondLst>
+                              <p:cond delay="0"/>
+                            </p:stCondLst>
+                            <p:childTnLst>
+                              <p:par>
+                                <p:cTn id="35" presetID="1" presetClass="entr" presetSubtype="0" fill="hold" grpId="0" nodeType="clickEffect">
+                                  <p:stCondLst>
+                                    <p:cond delay="0"/>
+                                  </p:stCondLst>
+                                  <p:childTnLst>
+                                    <p:set>
+                                      <p:cBhvr>
+                                        <p:cTn id="36" dur="1" fill="hold">
+                                          <p:stCondLst>
+                                            <p:cond delay="0"/>
+                                          </p:stCondLst>
+                                        </p:cTn>
+                                        <p:tgtEl>
+                                          <p:spTgt spid="8">
+                                            <p:txEl>
+                                              <p:pRg st="7" end="7"/>
+                                            </p:txEl>
+                                          </p:spTgt>
+                                        </p:tgtEl>
+                                        <p:attrNameLst>
+                                          <p:attrName>style.visibility</p:attrName>
+                                        </p:attrNameLst>
+                                      </p:cBhvr>
+                                      <p:to>
+                                        <p:strVal val="visible"/>
+                                      </p:to>
+                                    </p:set>
+                                  </p:childTnLst>
+                                </p:cTn>
+                              </p:par>
+                            </p:childTnLst>
+                          </p:cTn>
+                        </p:par>
+                        <p:par>
+                          <p:cTn id="37" fill="hold">
+                            <p:stCondLst>
+                              <p:cond delay="0"/>
+                            </p:stCondLst>
+                            <p:childTnLst>
+                              <p:par>
+                                <p:cTn id="38" presetID="10" presetClass="entr" presetSubtype="0" fill="hold" nodeType="afterEffect">
+                                  <p:stCondLst>
+                                    <p:cond delay="0"/>
+                                  </p:stCondLst>
+                                  <p:childTnLst>
+                                    <p:set>
+                                      <p:cBhvr>
+                                        <p:cTn id="39" dur="1" fill="hold">
+                                          <p:stCondLst>
+                                            <p:cond delay="0"/>
+                                          </p:stCondLst>
+                                        </p:cTn>
+                                        <p:tgtEl>
+                                          <p:spTgt spid="4098"/>
+                                        </p:tgtEl>
+                                        <p:attrNameLst>
+                                          <p:attrName>style.visibility</p:attrName>
+                                        </p:attrNameLst>
+                                      </p:cBhvr>
+                                      <p:to>
+                                        <p:strVal val="visible"/>
+                                      </p:to>
+                                    </p:set>
+                                    <p:animEffect transition="in" filter="fade">
+                                      <p:cBhvr>
+                                        <p:cTn id="40" dur="500"/>
+                                        <p:tgtEl>
+                                          <p:spTgt spid="4098"/>
+                                        </p:tgtEl>
+                                      </p:cBhvr>
+                                    </p:animEffect>
                                   </p:childTnLst>
                                 </p:cTn>
                               </p:par>
@@ -3319,12 +4868,15 @@
     </p:tnLst>
     <p:bldLst>
       <p:bldP spid="8" grpId="0" uiExpand="1" build="p" animBg="1"/>
+      <p:bldP spid="3" grpId="0" animBg="1"/>
+      <p:bldP spid="9" grpId="0" animBg="1"/>
+      <p:bldP spid="10" grpId="0" animBg="1"/>
     </p:bldLst>
   </p:timing>
 </p:sld>
 </file>
 
-<file path=ppt/slides/slide5.xml><?xml version="1.0" encoding="utf-8"?>
+<file path=ppt/slides/slide6.xml><?xml version="1.0" encoding="utf-8"?>
 <p:sld xmlns:a="http://schemas.openxmlformats.org/drawingml/2006/main" xmlns:r="http://schemas.openxmlformats.org/officeDocument/2006/relationships" xmlns:p="http://schemas.openxmlformats.org/presentationml/2006/main">
   <p:cSld>
     <p:spTree>
@@ -3353,14 +4905,76 @@
         </p:nvSpPr>
         <p:spPr/>
         <p:txBody>
-          <a:bodyPr>
-            <a:normAutofit/>
-          </a:bodyPr>
+          <a:bodyPr/>
           <a:lstStyle/>
           <a:p>
             <a:r>
               <a:rPr lang="en-GB" dirty="0" smtClean="0"/>
-              <a:t>3. Methods for ELM control</a:t>
+              <a:t>2. ITER’s requirements</a:t>
+            </a:r>
+            <a:endParaRPr lang="en-GB" dirty="0"/>
+          </a:p>
+        </p:txBody>
+      </p:sp>
+      <p:sp>
+        <p:nvSpPr>
+          <p:cNvPr id="3" name="Content Placeholder 2"/>
+          <p:cNvSpPr>
+            <a:spLocks noGrp="1"/>
+          </p:cNvSpPr>
+          <p:nvPr>
+            <p:ph idx="1"/>
+          </p:nvPr>
+        </p:nvSpPr>
+        <p:spPr>
+          <a:xfrm>
+            <a:off x="838200" y="1520825"/>
+            <a:ext cx="6629400" cy="4351338"/>
+          </a:xfrm>
+        </p:spPr>
+        <p:txBody>
+          <a:bodyPr/>
+          <a:lstStyle/>
+          <a:p>
+            <a:r>
+              <a:rPr lang="en-GB" dirty="0" smtClean="0"/>
+              <a:t>Minimum ELM frequency increase to maintain acceptable impurity levels and sufficient PFC lifetime, depending on plasma current.</a:t>
+            </a:r>
+          </a:p>
+          <a:p>
+            <a:endParaRPr lang="en-GB" dirty="0"/>
+          </a:p>
+          <a:p>
+            <a:r>
+              <a:rPr lang="en-GB" dirty="0" smtClean="0"/>
+              <a:t>Target operation: 15 MA</a:t>
+            </a:r>
+          </a:p>
+          <a:p>
+            <a:pPr lvl="1"/>
+            <a:r>
+              <a:rPr lang="en-GB" dirty="0" smtClean="0"/>
+              <a:t>AT LEAST need a sustained </a:t>
+            </a:r>
+            <a:r>
+              <a:rPr lang="en-GB" b="1" dirty="0" smtClean="0"/>
+              <a:t>&gt;40 </a:t>
+            </a:r>
+            <a:r>
+              <a:rPr lang="en-GB" dirty="0" smtClean="0"/>
+              <a:t>times </a:t>
+            </a:r>
+            <a:r>
+              <a:rPr lang="en-GB" b="1" dirty="0" err="1" smtClean="0"/>
+              <a:t>f</a:t>
+            </a:r>
+            <a:r>
+              <a:rPr lang="en-GB" b="1" baseline="-25000" dirty="0" err="1" smtClean="0"/>
+              <a:t>ELM</a:t>
+            </a:r>
+            <a:r>
+              <a:rPr lang="en-GB" dirty="0" smtClean="0"/>
+              <a:t> increase</a:t>
             </a:r>
             <a:endParaRPr lang="en-GB" dirty="0"/>
           </a:p>
@@ -3396,10 +5010,15 @@
             <a:spLocks noGrp="1"/>
           </p:cNvSpPr>
           <p:nvPr>
-            <p:ph type="ftr" sz="quarter" idx="11"/>
-          </p:nvPr>
-        </p:nvSpPr>
-        <p:spPr/>
+            <p:ph type="ftr" sz="quarter" idx="3"/>
+          </p:nvPr>
+        </p:nvSpPr>
+        <p:spPr>
+          <a:xfrm>
+            <a:off x="7912100" y="6343650"/>
+            <a:ext cx="4114800" cy="365125"/>
+          </a:xfrm>
+        </p:spPr>
         <p:txBody>
           <a:bodyPr/>
           <a:lstStyle/>
@@ -3422,87 +5041,29 @@
             <p:ph type="sldNum" sz="quarter" idx="12"/>
           </p:nvPr>
         </p:nvSpPr>
-        <p:spPr/>
+        <p:spPr>
+          <a:xfrm>
+            <a:off x="8610600" y="6356350"/>
+            <a:ext cx="2743200" cy="365125"/>
+          </a:xfrm>
+        </p:spPr>
         <p:txBody>
           <a:bodyPr/>
           <a:lstStyle/>
           <a:p>
             <a:fld id="{581BB28B-6C27-444C-B2E2-3960C28AE47A}" type="slidenum">
               <a:rPr lang="en-GB" smtClean="0"/>
-              <a:t>5</a:t>
+              <a:t>6</a:t>
             </a:fld>
             <a:endParaRPr lang="en-GB"/>
           </a:p>
         </p:txBody>
       </p:sp>
-      <p:sp>
-        <p:nvSpPr>
-          <p:cNvPr id="8" name="Content Placeholder 7"/>
-          <p:cNvSpPr>
-            <a:spLocks noGrp="1"/>
-          </p:cNvSpPr>
-          <p:nvPr>
-            <p:ph idx="1"/>
-          </p:nvPr>
-        </p:nvSpPr>
-        <p:spPr>
-          <a:xfrm>
-            <a:off x="514350" y="1520825"/>
-            <a:ext cx="11391900" cy="1588504"/>
-          </a:xfrm>
-        </p:spPr>
-        <p:txBody>
-          <a:bodyPr/>
-          <a:lstStyle/>
-          <a:p>
-            <a:r>
-              <a:rPr lang="en-GB" dirty="0" smtClean="0"/>
-              <a:t>Several tokamaks have corroborated this scaling for ELM frequency</a:t>
-            </a:r>
-            <a:r>
-              <a:rPr lang="en-GB" dirty="0" smtClean="0"/>
-              <a:t>, </a:t>
-            </a:r>
-            <a:r>
-              <a:rPr lang="en-GB" b="1" dirty="0" err="1" smtClean="0"/>
-              <a:t>f</a:t>
-            </a:r>
-            <a:r>
-              <a:rPr lang="en-GB" b="1" baseline="-25000" dirty="0" err="1" smtClean="0"/>
-              <a:t>ELM</a:t>
-            </a:r>
-            <a:r>
-              <a:rPr lang="en-GB" dirty="0" smtClean="0"/>
-              <a:t> </a:t>
-            </a:r>
-            <a:endParaRPr lang="en-GB" dirty="0" smtClean="0"/>
-          </a:p>
-          <a:p>
-            <a:r>
-              <a:rPr lang="en-GB" b="1" dirty="0" smtClean="0"/>
-              <a:t>∆W</a:t>
-            </a:r>
-            <a:r>
-              <a:rPr lang="en-GB" b="1" baseline="-25000" dirty="0" smtClean="0"/>
-              <a:t>ELM</a:t>
-            </a:r>
-            <a:r>
-              <a:rPr lang="en-GB" b="1" dirty="0" smtClean="0"/>
-              <a:t> </a:t>
-            </a:r>
-            <a:r>
-              <a:rPr lang="en-GB" dirty="0" smtClean="0"/>
-              <a:t>is the ELM energy</a:t>
-            </a:r>
-            <a:endParaRPr lang="en-GB" b="1" dirty="0" smtClean="0"/>
-          </a:p>
-        </p:txBody>
-      </p:sp>
       <p:pic>
         <p:nvPicPr>
-          <p:cNvPr id="9" name="Content Placeholder 6"/>
+          <p:cNvPr id="1026" name="Picture 2" descr="C:\Users\joe\Documents\GitHub\FFessay\Latex_documents\Figures\FreqEnhance.PNG"/>
           <p:cNvPicPr>
-            <a:picLocks noChangeAspect="1"/>
+            <a:picLocks noChangeAspect="1" noChangeArrowheads="1"/>
           </p:cNvPicPr>
           <p:nvPr/>
         </p:nvPicPr>
@@ -3514,35 +5075,46 @@
               </a:ext>
             </a:extLst>
           </a:blip>
+          <a:srcRect/>
           <a:stretch>
             <a:fillRect/>
           </a:stretch>
         </p:blipFill>
-        <p:spPr>
-          <a:xfrm>
-            <a:off x="838200" y="3109329"/>
-            <a:ext cx="10515600" cy="1174330"/>
-          </a:xfrm>
-          <a:prstGeom prst="rect">
-            <a:avLst/>
-          </a:prstGeom>
-        </p:spPr>
-      </p:pic>
-      <p:sp>
-        <p:nvSpPr>
-          <p:cNvPr id="10" name="TextBox 9"/>
-          <p:cNvSpPr txBox="1"/>
-          <p:nvPr/>
-        </p:nvSpPr>
-        <p:spPr>
-          <a:xfrm>
-            <a:off x="5524500" y="4283659"/>
-            <a:ext cx="5829300" cy="338554"/>
+        <p:spPr bwMode="auto">
+          <a:xfrm>
+            <a:off x="7629525" y="1538288"/>
+            <a:ext cx="3806574" cy="4138612"/>
           </a:xfrm>
           <a:prstGeom prst="rect">
             <a:avLst/>
           </a:prstGeom>
           <a:noFill/>
+          <a:extLst>
+            <a:ext uri="{909E8E84-426E-40DD-AFC4-6F175D3DCCD1}">
+              <a14:hiddenFill xmlns:a14="http://schemas.microsoft.com/office/drawing/2010/main">
+                <a:solidFill>
+                  <a:srgbClr val="FFFFFF"/>
+                </a:solidFill>
+              </a14:hiddenFill>
+            </a:ext>
+          </a:extLst>
+        </p:spPr>
+      </p:pic>
+      <p:sp>
+        <p:nvSpPr>
+          <p:cNvPr id="7" name="TextBox 6"/>
+          <p:cNvSpPr txBox="1"/>
+          <p:nvPr/>
+        </p:nvSpPr>
+        <p:spPr>
+          <a:xfrm>
+            <a:off x="7629525" y="5676900"/>
+            <a:ext cx="3806574" cy="338554"/>
+          </a:xfrm>
+          <a:prstGeom prst="rect">
+            <a:avLst/>
+          </a:prstGeom>
+          <a:noFill/>
         </p:spPr>
         <p:txBody>
           <a:bodyPr wrap="square" rtlCol="0">
@@ -3550,26 +5122,33 @@
           </a:bodyPr>
           <a:lstStyle/>
           <a:p>
+            <a:r>
+              <a:rPr lang="en-GB" sz="1600" dirty="0">
+                <a:latin typeface="Batang" panose="02030600000101010101" pitchFamily="18" charset="-127"/>
+                <a:ea typeface="Batang" panose="02030600000101010101" pitchFamily="18" charset="-127"/>
+              </a:rPr>
+              <a:t>A. Kirk </a:t>
+            </a:r>
             <a:r>
               <a:rPr lang="en-GB" sz="1600" dirty="0" smtClean="0">
                 <a:latin typeface="Batang" panose="02030600000101010101" pitchFamily="18" charset="-127"/>
                 <a:ea typeface="Batang" panose="02030600000101010101" pitchFamily="18" charset="-127"/>
               </a:rPr>
-              <a:t>A. Leonard Journal of Nuclear Materials </a:t>
-            </a:r>
-            <a:r>
-              <a:rPr lang="en-GB" sz="1600" b="1" dirty="0" smtClean="0">
+              <a:t>Phys. Rev. Lett. </a:t>
+            </a:r>
+            <a:r>
+              <a:rPr lang="en-GB" sz="1600" dirty="0">
                 <a:latin typeface="Batang" panose="02030600000101010101" pitchFamily="18" charset="-127"/>
                 <a:ea typeface="Batang" panose="02030600000101010101" pitchFamily="18" charset="-127"/>
               </a:rPr>
-              <a:t>266</a:t>
+              <a:t>108.25 </a:t>
             </a:r>
             <a:r>
               <a:rPr lang="en-GB" sz="1600" dirty="0" smtClean="0">
                 <a:latin typeface="Batang" panose="02030600000101010101" pitchFamily="18" charset="-127"/>
                 <a:ea typeface="Batang" panose="02030600000101010101" pitchFamily="18" charset="-127"/>
               </a:rPr>
-              <a:t> 1999</a:t>
+              <a:t>2013</a:t>
             </a:r>
             <a:endParaRPr lang="en-GB" sz="1600" dirty="0">
               <a:latin typeface="Batang" panose="02030600000101010101" pitchFamily="18" charset="-127"/>
@@ -3581,7 +5160,652 @@
     </p:spTree>
     <p:extLst>
       <p:ext uri="{BB962C8B-B14F-4D97-AF65-F5344CB8AC3E}">
-        <p14:creationId xmlns:p14="http://schemas.microsoft.com/office/powerpoint/2010/main" val="1217640621"/>
+        <p14:creationId xmlns:p14="http://schemas.microsoft.com/office/powerpoint/2010/main" val="1207119539"/>
+      </p:ext>
+    </p:extLst>
+  </p:cSld>
+  <p:clrMapOvr>
+    <a:masterClrMapping/>
+  </p:clrMapOvr>
+  <p:timing>
+    <p:tnLst>
+      <p:par>
+        <p:cTn id="1" dur="indefinite" restart="never" nodeType="tmRoot"/>
+      </p:par>
+    </p:tnLst>
+  </p:timing>
+</p:sld>
+</file>
+
+<file path=ppt/slides/slide7.xml><?xml version="1.0" encoding="utf-8"?>
+<p:sld xmlns:a="http://schemas.openxmlformats.org/drawingml/2006/main" xmlns:r="http://schemas.openxmlformats.org/officeDocument/2006/relationships" xmlns:p="http://schemas.openxmlformats.org/presentationml/2006/main">
+  <p:cSld>
+    <p:spTree>
+      <p:nvGrpSpPr>
+        <p:cNvPr id="1" name=""/>
+        <p:cNvGrpSpPr/>
+        <p:nvPr/>
+      </p:nvGrpSpPr>
+      <p:grpSpPr>
+        <a:xfrm>
+          <a:off x="0" y="0"/>
+          <a:ext cx="0" cy="0"/>
+          <a:chOff x="0" y="0"/>
+          <a:chExt cx="0" cy="0"/>
+        </a:xfrm>
+      </p:grpSpPr>
+      <p:sp>
+        <p:nvSpPr>
+          <p:cNvPr id="2" name="Title 1"/>
+          <p:cNvSpPr>
+            <a:spLocks noGrp="1"/>
+          </p:cNvSpPr>
+          <p:nvPr>
+            <p:ph type="title"/>
+          </p:nvPr>
+        </p:nvSpPr>
+        <p:spPr/>
+        <p:txBody>
+          <a:bodyPr>
+            <a:normAutofit/>
+          </a:bodyPr>
+          <a:lstStyle/>
+          <a:p>
+            <a:r>
+              <a:rPr lang="en-GB" dirty="0" smtClean="0"/>
+              <a:t>3. Methods </a:t>
+            </a:r>
+            <a:r>
+              <a:rPr lang="en-GB" dirty="0"/>
+              <a:t>for ELM </a:t>
+            </a:r>
+            <a:r>
+              <a:rPr lang="en-GB" dirty="0" smtClean="0"/>
+              <a:t>control</a:t>
+            </a:r>
+            <a:endParaRPr lang="en-GB" dirty="0"/>
+          </a:p>
+        </p:txBody>
+      </p:sp>
+      <p:sp>
+        <p:nvSpPr>
+          <p:cNvPr id="3" name="Content Placeholder 2"/>
+          <p:cNvSpPr>
+            <a:spLocks noGrp="1"/>
+          </p:cNvSpPr>
+          <p:nvPr>
+            <p:ph idx="1"/>
+          </p:nvPr>
+        </p:nvSpPr>
+        <p:spPr/>
+        <p:txBody>
+          <a:bodyPr/>
+          <a:lstStyle/>
+          <a:p>
+            <a:r>
+              <a:rPr lang="en-GB" dirty="0" smtClean="0"/>
+              <a:t>RMP – suppress ELMs by keeping below PB stability limit</a:t>
+            </a:r>
+          </a:p>
+          <a:p>
+            <a:r>
+              <a:rPr lang="en-GB" dirty="0" smtClean="0"/>
+              <a:t>PI &amp; VK – mitigation by increasing </a:t>
+            </a:r>
+            <a:r>
+              <a:rPr lang="en-GB" dirty="0" err="1" smtClean="0"/>
+              <a:t>f_ELM</a:t>
+            </a:r>
+            <a:r>
+              <a:rPr lang="en-GB" dirty="0" smtClean="0"/>
+              <a:t> </a:t>
+            </a:r>
+            <a:r>
+              <a:rPr lang="en-GB" dirty="0" smtClean="0">
+                <a:sym typeface="Wingdings" panose="05000000000000000000" pitchFamily="2" charset="2"/>
+              </a:rPr>
+              <a:t> less damage to PFCs</a:t>
+            </a:r>
+          </a:p>
+          <a:p>
+            <a:r>
+              <a:rPr lang="en-GB" dirty="0" smtClean="0"/>
+              <a:t>ITER coil layout pic</a:t>
+            </a:r>
+          </a:p>
+          <a:p>
+            <a:endParaRPr lang="en-GB" dirty="0"/>
+          </a:p>
+        </p:txBody>
+      </p:sp>
+      <p:sp>
+        <p:nvSpPr>
+          <p:cNvPr id="4" name="Date Placeholder 3"/>
+          <p:cNvSpPr>
+            <a:spLocks noGrp="1"/>
+          </p:cNvSpPr>
+          <p:nvPr>
+            <p:ph type="dt" sz="half" idx="10"/>
+          </p:nvPr>
+        </p:nvSpPr>
+        <p:spPr/>
+        <p:txBody>
+          <a:bodyPr/>
+          <a:lstStyle/>
+          <a:p>
+            <a:r>
+              <a:rPr lang="en-GB" smtClean="0"/>
+              <a:t>31/05/2016</a:t>
+            </a:r>
+            <a:endParaRPr lang="en-GB" dirty="0"/>
+          </a:p>
+        </p:txBody>
+      </p:sp>
+      <p:sp>
+        <p:nvSpPr>
+          <p:cNvPr id="5" name="Footer Placeholder 4"/>
+          <p:cNvSpPr>
+            <a:spLocks noGrp="1"/>
+          </p:cNvSpPr>
+          <p:nvPr>
+            <p:ph type="ftr" sz="quarter" idx="3"/>
+          </p:nvPr>
+        </p:nvSpPr>
+        <p:spPr>
+          <a:xfrm>
+            <a:off x="7912100" y="6343650"/>
+            <a:ext cx="4114800" cy="365125"/>
+          </a:xfrm>
+        </p:spPr>
+        <p:txBody>
+          <a:bodyPr/>
+          <a:lstStyle/>
+          <a:p>
+            <a:r>
+              <a:rPr lang="en-GB" smtClean="0"/>
+              <a:t>JOA509 – Frontiers of Fusion</a:t>
+            </a:r>
+            <a:endParaRPr lang="en-GB" dirty="0"/>
+          </a:p>
+        </p:txBody>
+      </p:sp>
+      <p:sp>
+        <p:nvSpPr>
+          <p:cNvPr id="6" name="Slide Number Placeholder 5"/>
+          <p:cNvSpPr>
+            <a:spLocks noGrp="1"/>
+          </p:cNvSpPr>
+          <p:nvPr>
+            <p:ph type="sldNum" sz="quarter" idx="12"/>
+          </p:nvPr>
+        </p:nvSpPr>
+        <p:spPr>
+          <a:xfrm>
+            <a:off x="8610600" y="6356350"/>
+            <a:ext cx="2743200" cy="365125"/>
+          </a:xfrm>
+        </p:spPr>
+        <p:txBody>
+          <a:bodyPr/>
+          <a:lstStyle/>
+          <a:p>
+            <a:fld id="{581BB28B-6C27-444C-B2E2-3960C28AE47A}" type="slidenum">
+              <a:rPr lang="en-GB" smtClean="0"/>
+              <a:t>7</a:t>
+            </a:fld>
+            <a:endParaRPr lang="en-GB"/>
+          </a:p>
+        </p:txBody>
+      </p:sp>
+    </p:spTree>
+    <p:extLst>
+      <p:ext uri="{BB962C8B-B14F-4D97-AF65-F5344CB8AC3E}">
+        <p14:creationId xmlns:p14="http://schemas.microsoft.com/office/powerpoint/2010/main" val="3862240862"/>
+      </p:ext>
+    </p:extLst>
+  </p:cSld>
+  <p:clrMapOvr>
+    <a:masterClrMapping/>
+  </p:clrMapOvr>
+  <p:timing>
+    <p:tnLst>
+      <p:par>
+        <p:cTn id="1" dur="indefinite" restart="never" nodeType="tmRoot"/>
+      </p:par>
+    </p:tnLst>
+  </p:timing>
+</p:sld>
+</file>
+
+<file path=ppt/slides/slide8.xml><?xml version="1.0" encoding="utf-8"?>
+<p:sld xmlns:a="http://schemas.openxmlformats.org/drawingml/2006/main" xmlns:r="http://schemas.openxmlformats.org/officeDocument/2006/relationships" xmlns:p="http://schemas.openxmlformats.org/presentationml/2006/main">
+  <p:cSld>
+    <p:spTree>
+      <p:nvGrpSpPr>
+        <p:cNvPr id="1" name=""/>
+        <p:cNvGrpSpPr/>
+        <p:nvPr/>
+      </p:nvGrpSpPr>
+      <p:grpSpPr>
+        <a:xfrm>
+          <a:off x="0" y="0"/>
+          <a:ext cx="0" cy="0"/>
+          <a:chOff x="0" y="0"/>
+          <a:chExt cx="0" cy="0"/>
+        </a:xfrm>
+      </p:grpSpPr>
+      <p:sp>
+        <p:nvSpPr>
+          <p:cNvPr id="2" name="Title 1"/>
+          <p:cNvSpPr>
+            <a:spLocks noGrp="1"/>
+          </p:cNvSpPr>
+          <p:nvPr>
+            <p:ph type="title"/>
+          </p:nvPr>
+        </p:nvSpPr>
+        <p:spPr/>
+        <p:txBody>
+          <a:bodyPr/>
+          <a:lstStyle/>
+          <a:p>
+            <a:endParaRPr lang="en-GB"/>
+          </a:p>
+        </p:txBody>
+      </p:sp>
+      <p:sp>
+        <p:nvSpPr>
+          <p:cNvPr id="3" name="Content Placeholder 2"/>
+          <p:cNvSpPr>
+            <a:spLocks noGrp="1"/>
+          </p:cNvSpPr>
+          <p:nvPr>
+            <p:ph idx="1"/>
+          </p:nvPr>
+        </p:nvSpPr>
+        <p:spPr/>
+        <p:txBody>
+          <a:bodyPr/>
+          <a:lstStyle/>
+          <a:p>
+            <a:endParaRPr lang="en-GB"/>
+          </a:p>
+        </p:txBody>
+      </p:sp>
+      <p:sp>
+        <p:nvSpPr>
+          <p:cNvPr id="4" name="Date Placeholder 3"/>
+          <p:cNvSpPr>
+            <a:spLocks noGrp="1"/>
+          </p:cNvSpPr>
+          <p:nvPr>
+            <p:ph type="dt" sz="half" idx="10"/>
+          </p:nvPr>
+        </p:nvSpPr>
+        <p:spPr/>
+        <p:txBody>
+          <a:bodyPr/>
+          <a:lstStyle/>
+          <a:p>
+            <a:r>
+              <a:rPr lang="en-GB" smtClean="0"/>
+              <a:t>31/05/2016</a:t>
+            </a:r>
+            <a:endParaRPr lang="en-GB" dirty="0"/>
+          </a:p>
+        </p:txBody>
+      </p:sp>
+      <p:sp>
+        <p:nvSpPr>
+          <p:cNvPr id="5" name="Footer Placeholder 4"/>
+          <p:cNvSpPr>
+            <a:spLocks noGrp="1"/>
+          </p:cNvSpPr>
+          <p:nvPr>
+            <p:ph type="ftr" sz="quarter" idx="3"/>
+          </p:nvPr>
+        </p:nvSpPr>
+        <p:spPr>
+          <a:xfrm>
+            <a:off x="7912100" y="6343650"/>
+            <a:ext cx="4114800" cy="365125"/>
+          </a:xfrm>
+        </p:spPr>
+        <p:txBody>
+          <a:bodyPr/>
+          <a:lstStyle/>
+          <a:p>
+            <a:r>
+              <a:rPr lang="en-GB" smtClean="0"/>
+              <a:t>JOA509 – Frontiers of Fusion</a:t>
+            </a:r>
+            <a:endParaRPr lang="en-GB" dirty="0"/>
+          </a:p>
+        </p:txBody>
+      </p:sp>
+      <p:sp>
+        <p:nvSpPr>
+          <p:cNvPr id="6" name="Slide Number Placeholder 5"/>
+          <p:cNvSpPr>
+            <a:spLocks noGrp="1"/>
+          </p:cNvSpPr>
+          <p:nvPr>
+            <p:ph type="sldNum" sz="quarter" idx="12"/>
+          </p:nvPr>
+        </p:nvSpPr>
+        <p:spPr>
+          <a:xfrm>
+            <a:off x="8610600" y="6356350"/>
+            <a:ext cx="2743200" cy="365125"/>
+          </a:xfrm>
+        </p:spPr>
+        <p:txBody>
+          <a:bodyPr/>
+          <a:lstStyle/>
+          <a:p>
+            <a:fld id="{581BB28B-6C27-444C-B2E2-3960C28AE47A}" type="slidenum">
+              <a:rPr lang="en-GB" smtClean="0"/>
+              <a:t>8</a:t>
+            </a:fld>
+            <a:endParaRPr lang="en-GB"/>
+          </a:p>
+        </p:txBody>
+      </p:sp>
+    </p:spTree>
+    <p:extLst>
+      <p:ext uri="{BB962C8B-B14F-4D97-AF65-F5344CB8AC3E}">
+        <p14:creationId xmlns:p14="http://schemas.microsoft.com/office/powerpoint/2010/main" val="3428766812"/>
+      </p:ext>
+    </p:extLst>
+  </p:cSld>
+  <p:clrMapOvr>
+    <a:masterClrMapping/>
+  </p:clrMapOvr>
+  <p:timing>
+    <p:tnLst>
+      <p:par>
+        <p:cTn id="1" dur="indefinite" restart="never" nodeType="tmRoot"/>
+      </p:par>
+    </p:tnLst>
+  </p:timing>
+</p:sld>
+</file>
+
+<file path=ppt/slides/slide9.xml><?xml version="1.0" encoding="utf-8"?>
+<p:sld xmlns:a="http://schemas.openxmlformats.org/drawingml/2006/main" xmlns:r="http://schemas.openxmlformats.org/officeDocument/2006/relationships" xmlns:p="http://schemas.openxmlformats.org/presentationml/2006/main">
+  <p:cSld>
+    <p:spTree>
+      <p:nvGrpSpPr>
+        <p:cNvPr id="1" name=""/>
+        <p:cNvGrpSpPr/>
+        <p:nvPr/>
+      </p:nvGrpSpPr>
+      <p:grpSpPr>
+        <a:xfrm>
+          <a:off x="0" y="0"/>
+          <a:ext cx="0" cy="0"/>
+          <a:chOff x="0" y="0"/>
+          <a:chExt cx="0" cy="0"/>
+        </a:xfrm>
+      </p:grpSpPr>
+      <p:sp>
+        <p:nvSpPr>
+          <p:cNvPr id="2" name="Title 1"/>
+          <p:cNvSpPr>
+            <a:spLocks noGrp="1"/>
+          </p:cNvSpPr>
+          <p:nvPr>
+            <p:ph type="title"/>
+          </p:nvPr>
+        </p:nvSpPr>
+        <p:spPr/>
+        <p:txBody>
+          <a:bodyPr>
+            <a:normAutofit/>
+          </a:bodyPr>
+          <a:lstStyle/>
+          <a:p>
+            <a:r>
+              <a:rPr lang="en-GB" b="1" dirty="0" smtClean="0"/>
+              <a:t>4</a:t>
+            </a:r>
+            <a:r>
+              <a:rPr lang="en-GB" dirty="0" smtClean="0"/>
+              <a:t>. </a:t>
+            </a:r>
+            <a:r>
+              <a:rPr lang="en-GB" dirty="0"/>
+              <a:t>ELM control on </a:t>
+            </a:r>
+            <a:r>
+              <a:rPr lang="en-GB" dirty="0" smtClean="0"/>
+              <a:t>ITER</a:t>
+            </a:r>
+            <a:endParaRPr lang="en-GB" dirty="0"/>
+          </a:p>
+        </p:txBody>
+      </p:sp>
+      <p:sp>
+        <p:nvSpPr>
+          <p:cNvPr id="3" name="Content Placeholder 2"/>
+          <p:cNvSpPr>
+            <a:spLocks noGrp="1"/>
+          </p:cNvSpPr>
+          <p:nvPr>
+            <p:ph idx="1"/>
+          </p:nvPr>
+        </p:nvSpPr>
+        <p:spPr>
+          <a:xfrm>
+            <a:off x="838200" y="1520825"/>
+            <a:ext cx="5991225" cy="4308475"/>
+          </a:xfrm>
+        </p:spPr>
+        <p:txBody>
+          <a:bodyPr/>
+          <a:lstStyle/>
+          <a:p>
+            <a:r>
+              <a:rPr lang="en-GB" dirty="0" smtClean="0"/>
+              <a:t>Vertical stability coils already included</a:t>
+            </a:r>
+          </a:p>
+          <a:p>
+            <a:endParaRPr lang="en-GB" dirty="0" smtClean="0"/>
+          </a:p>
+          <a:p>
+            <a:r>
+              <a:rPr lang="en-GB" dirty="0" smtClean="0"/>
+              <a:t>27 RMP coils added to design</a:t>
+            </a:r>
+            <a:endParaRPr lang="en-GB" dirty="0"/>
+          </a:p>
+          <a:p>
+            <a:endParaRPr lang="en-GB" dirty="0" smtClean="0"/>
+          </a:p>
+          <a:p>
+            <a:r>
+              <a:rPr lang="en-GB" dirty="0" smtClean="0"/>
+              <a:t>Pellet injectors also added</a:t>
+            </a:r>
+            <a:endParaRPr lang="en-GB" dirty="0"/>
+          </a:p>
+        </p:txBody>
+      </p:sp>
+      <p:sp>
+        <p:nvSpPr>
+          <p:cNvPr id="4" name="Date Placeholder 3"/>
+          <p:cNvSpPr>
+            <a:spLocks noGrp="1"/>
+          </p:cNvSpPr>
+          <p:nvPr>
+            <p:ph type="dt" sz="half" idx="10"/>
+          </p:nvPr>
+        </p:nvSpPr>
+        <p:spPr/>
+        <p:txBody>
+          <a:bodyPr/>
+          <a:lstStyle/>
+          <a:p>
+            <a:r>
+              <a:rPr lang="en-GB" smtClean="0"/>
+              <a:t>31/05/2016</a:t>
+            </a:r>
+            <a:endParaRPr lang="en-GB" dirty="0"/>
+          </a:p>
+        </p:txBody>
+      </p:sp>
+      <p:sp>
+        <p:nvSpPr>
+          <p:cNvPr id="5" name="Footer Placeholder 4"/>
+          <p:cNvSpPr>
+            <a:spLocks noGrp="1"/>
+          </p:cNvSpPr>
+          <p:nvPr>
+            <p:ph type="ftr" sz="quarter" idx="3"/>
+          </p:nvPr>
+        </p:nvSpPr>
+        <p:spPr>
+          <a:xfrm>
+            <a:off x="7912100" y="6343650"/>
+            <a:ext cx="4114800" cy="365125"/>
+          </a:xfrm>
+        </p:spPr>
+        <p:txBody>
+          <a:bodyPr/>
+          <a:lstStyle/>
+          <a:p>
+            <a:r>
+              <a:rPr lang="en-GB" smtClean="0"/>
+              <a:t>JOA509 – Frontiers of Fusion</a:t>
+            </a:r>
+            <a:endParaRPr lang="en-GB" dirty="0"/>
+          </a:p>
+        </p:txBody>
+      </p:sp>
+      <p:sp>
+        <p:nvSpPr>
+          <p:cNvPr id="6" name="Slide Number Placeholder 5"/>
+          <p:cNvSpPr>
+            <a:spLocks noGrp="1"/>
+          </p:cNvSpPr>
+          <p:nvPr>
+            <p:ph type="sldNum" sz="quarter" idx="12"/>
+          </p:nvPr>
+        </p:nvSpPr>
+        <p:spPr>
+          <a:xfrm>
+            <a:off x="8610600" y="6356350"/>
+            <a:ext cx="2743200" cy="365125"/>
+          </a:xfrm>
+        </p:spPr>
+        <p:txBody>
+          <a:bodyPr/>
+          <a:lstStyle/>
+          <a:p>
+            <a:fld id="{581BB28B-6C27-444C-B2E2-3960C28AE47A}" type="slidenum">
+              <a:rPr lang="en-GB" smtClean="0"/>
+              <a:t>9</a:t>
+            </a:fld>
+            <a:endParaRPr lang="en-GB"/>
+          </a:p>
+        </p:txBody>
+      </p:sp>
+      <p:pic>
+        <p:nvPicPr>
+          <p:cNvPr id="2050" name="Picture 2" descr="C:\Users\joe\Documents\GitHub\FFessay\Latex_documents\Figures\ITERcoils.PNG"/>
+          <p:cNvPicPr>
+            <a:picLocks noChangeAspect="1" noChangeArrowheads="1"/>
+          </p:cNvPicPr>
+          <p:nvPr/>
+        </p:nvPicPr>
+        <p:blipFill>
+          <a:blip r:embed="rId2">
+            <a:extLst>
+              <a:ext uri="{28A0092B-C50C-407E-A947-70E740481C1C}">
+                <a14:useLocalDpi xmlns:a14="http://schemas.microsoft.com/office/drawing/2010/main" val="0"/>
+              </a:ext>
+            </a:extLst>
+          </a:blip>
+          <a:srcRect/>
+          <a:stretch>
+            <a:fillRect/>
+          </a:stretch>
+        </p:blipFill>
+        <p:spPr bwMode="auto">
+          <a:xfrm>
+            <a:off x="6829425" y="1409700"/>
+            <a:ext cx="5162550" cy="4419600"/>
+          </a:xfrm>
+          <a:prstGeom prst="rect">
+            <a:avLst/>
+          </a:prstGeom>
+          <a:noFill/>
+          <a:extLst>
+            <a:ext uri="{909E8E84-426E-40DD-AFC4-6F175D3DCCD1}">
+              <a14:hiddenFill xmlns:a14="http://schemas.microsoft.com/office/drawing/2010/main">
+                <a:solidFill>
+                  <a:srgbClr val="FFFFFF"/>
+                </a:solidFill>
+              </a14:hiddenFill>
+            </a:ext>
+          </a:extLst>
+        </p:spPr>
+      </p:pic>
+      <p:sp>
+        <p:nvSpPr>
+          <p:cNvPr id="7" name="TextBox 6"/>
+          <p:cNvSpPr txBox="1"/>
+          <p:nvPr/>
+        </p:nvSpPr>
+        <p:spPr>
+          <a:xfrm>
+            <a:off x="6829425" y="5829300"/>
+            <a:ext cx="5162550" cy="369332"/>
+          </a:xfrm>
+          <a:prstGeom prst="rect">
+            <a:avLst/>
+          </a:prstGeom>
+          <a:noFill/>
+        </p:spPr>
+        <p:txBody>
+          <a:bodyPr wrap="square" rtlCol="0">
+            <a:spAutoFit/>
+          </a:bodyPr>
+          <a:lstStyle/>
+          <a:p>
+            <a:r>
+              <a:rPr lang="da-DK" dirty="0" smtClean="0">
+                <a:latin typeface="Batang" panose="02030600000101010101" pitchFamily="18" charset="-127"/>
+                <a:ea typeface="Batang" panose="02030600000101010101" pitchFamily="18" charset="-127"/>
+              </a:rPr>
+              <a:t>P. Lang </a:t>
+            </a:r>
+            <a:r>
+              <a:rPr lang="da-DK" dirty="0">
+                <a:latin typeface="Batang" panose="02030600000101010101" pitchFamily="18" charset="-127"/>
+                <a:ea typeface="Batang" panose="02030600000101010101" pitchFamily="18" charset="-127"/>
+              </a:rPr>
+              <a:t>Nuclear Fusion 53.4 </a:t>
+            </a:r>
+            <a:r>
+              <a:rPr lang="da-DK" dirty="0" smtClean="0">
+                <a:latin typeface="Batang" panose="02030600000101010101" pitchFamily="18" charset="-127"/>
+                <a:ea typeface="Batang" panose="02030600000101010101" pitchFamily="18" charset="-127"/>
+              </a:rPr>
+              <a:t>2013</a:t>
+            </a:r>
+            <a:endParaRPr lang="da-DK" dirty="0">
+              <a:latin typeface="Batang" panose="02030600000101010101" pitchFamily="18" charset="-127"/>
+              <a:ea typeface="Batang" panose="02030600000101010101" pitchFamily="18" charset="-127"/>
+            </a:endParaRPr>
+          </a:p>
+        </p:txBody>
+      </p:sp>
+    </p:spTree>
+    <p:extLst>
+      <p:ext uri="{BB962C8B-B14F-4D97-AF65-F5344CB8AC3E}">
+        <p14:creationId xmlns:p14="http://schemas.microsoft.com/office/powerpoint/2010/main" val="4171542233"/>
       </p:ext>
     </p:extLst>
   </p:cSld>
@@ -3853,7 +6077,7 @@
   <a:extraClrSchemeLst/>
   <a:extLst>
     <a:ext uri="{05A4C25C-085E-4340-85A3-A5531E510DB2}">
-      <thm15:themeFamily xmlns:thm15="http://schemas.microsoft.com/office/thememl/2012/main" name="Office Theme" id="{62F939B6-93AF-4DB8-9C6B-D6C7DFDC589F}" vid="{4A3C46E8-61CC-4603-A589-7422A47A8E4A}"/>
+      <thm15:themeFamily xmlns:thm15="http://schemas.microsoft.com/office/thememl/2012/main" xmlns="" name="Office Theme" id="{62F939B6-93AF-4DB8-9C6B-D6C7DFDC589F}" vid="{4A3C46E8-61CC-4603-A589-7422A47A8E4A}"/>
     </a:ext>
   </a:extLst>
 </a:theme>
@@ -4114,7 +6338,7 @@
   <a:extraClrSchemeLst/>
   <a:extLst>
     <a:ext uri="{05A4C25C-085E-4340-85A3-A5531E510DB2}">
-      <thm15:themeFamily xmlns:thm15="http://schemas.microsoft.com/office/thememl/2012/main" name="Office Theme" id="{62F939B6-93AF-4DB8-9C6B-D6C7DFDC589F}" vid="{4A3C46E8-61CC-4603-A589-7422A47A8E4A}"/>
+      <thm15:themeFamily xmlns:thm15="http://schemas.microsoft.com/office/thememl/2012/main" xmlns="" name="Office Theme" id="{62F939B6-93AF-4DB8-9C6B-D6C7DFDC589F}" vid="{4A3C46E8-61CC-4603-A589-7422A47A8E4A}"/>
     </a:ext>
   </a:extLst>
 </a:theme>

</xml_diff>